<commit_message>
realizadas alterações (validado pelo professor)
</commit_message>
<xml_diff>
--- a/Proto_Persona.pptx
+++ b/Proto_Persona.pptx
@@ -3381,7 +3381,7 @@
         <p:spPr>
           <a:xfrm>
             <a:off x="717452" y="1861838"/>
-            <a:ext cx="2011680" cy="1015663"/>
+            <a:ext cx="2011680" cy="400110"/>
           </a:xfrm>
           <a:prstGeom prst="rect">
             <a:avLst/>
@@ -3395,32 +3395,12 @@
           <a:lstStyle/>
           <a:p>
             <a:r>
-              <a:rPr lang="pt-BR" sz="2000" b="1" dirty="0">
+              <a:rPr lang="pt-BR" sz="2000" b="1" dirty="0" smtClean="0">
                 <a:latin typeface="Exo 2" panose="00000500000000000000" pitchFamily="50" charset="0"/>
               </a:rPr>
-              <a:t>Empresas de Tecnologia. </a:t>
-            </a:r>
-          </a:p>
-          <a:p>
-            <a:r>
-              <a:rPr lang="pt-BR" sz="2000" dirty="0" err="1">
-                <a:latin typeface="Exo 2" panose="00000500000000000000" pitchFamily="50" charset="0"/>
-              </a:rPr>
-              <a:t>Ex</a:t>
-            </a:r>
-            <a:r>
-              <a:rPr lang="pt-BR" sz="2000" dirty="0">
-                <a:latin typeface="Exo 2" panose="00000500000000000000" pitchFamily="50" charset="0"/>
-              </a:rPr>
-              <a:t>: </a:t>
-            </a:r>
-            <a:r>
-              <a:rPr lang="pt-BR" sz="2000" dirty="0" err="1">
-                <a:latin typeface="Exo 2" panose="00000500000000000000" pitchFamily="50" charset="0"/>
-              </a:rPr>
-              <a:t>ExenTec</a:t>
-            </a:r>
-            <a:endParaRPr lang="pt-BR" sz="2000" dirty="0">
+              <a:t>José Ribeiro</a:t>
+            </a:r>
+            <a:endParaRPr lang="pt-BR" sz="2000" b="1" dirty="0">
               <a:latin typeface="Exo 2" panose="00000500000000000000" pitchFamily="50" charset="0"/>
             </a:endParaRPr>
           </a:p>
@@ -3677,7 +3657,7 @@
         <p:spPr>
           <a:xfrm>
             <a:off x="6539132" y="1845319"/>
-            <a:ext cx="4708293" cy="2769989"/>
+            <a:ext cx="5324620" cy="1815882"/>
           </a:xfrm>
           <a:prstGeom prst="rect">
             <a:avLst/>
@@ -3695,11 +3675,14 @@
               <a:buChar char="•"/>
             </a:pPr>
             <a:r>
-              <a:rPr lang="pt-BR" sz="2000" dirty="0">
-                <a:latin typeface="Exo 2" panose="00000500000000000000" pitchFamily="50" charset="0"/>
-              </a:rPr>
-              <a:t>Idade do negócio (pequeno, médio, grande porte)</a:t>
-            </a:r>
+              <a:rPr lang="pt-BR" sz="1600" dirty="0" smtClean="0"/>
+              <a:t>R</a:t>
+            </a:r>
+            <a:r>
+              <a:rPr lang="pt-BR" sz="1600" dirty="0" smtClean="0"/>
+              <a:t>esponsável pela segurança da informação de uma empresa de TI</a:t>
+            </a:r>
+            <a:endParaRPr lang="pt-BR" sz="1600" dirty="0"/>
           </a:p>
           <a:p>
             <a:pPr marL="285750" indent="-285750">
@@ -3707,10 +3690,12 @@
               <a:buChar char="•"/>
             </a:pPr>
             <a:r>
-              <a:rPr lang="pt-BR" sz="2000" dirty="0">
-                <a:latin typeface="Exo 2" panose="00000500000000000000" pitchFamily="50" charset="0"/>
-              </a:rPr>
-              <a:t>Utiliza um sistema de segurança</a:t>
+              <a:rPr lang="pt-BR" sz="1600" dirty="0"/>
+              <a:t>Lida com informações de alto </a:t>
+            </a:r>
+            <a:r>
+              <a:rPr lang="pt-BR" sz="1600" dirty="0" smtClean="0"/>
+              <a:t>sigilo</a:t>
             </a:r>
           </a:p>
           <a:p>
@@ -3719,10 +3704,8 @@
               <a:buChar char="•"/>
             </a:pPr>
             <a:r>
-              <a:rPr lang="pt-BR" sz="2000" dirty="0">
-                <a:latin typeface="Exo 2" panose="00000500000000000000" pitchFamily="50" charset="0"/>
-              </a:rPr>
-              <a:t>Lida com informações de alto sigilo</a:t>
+              <a:rPr lang="pt-BR" sz="1600" dirty="0" smtClean="0"/>
+              <a:t>Antenado em tecnologia</a:t>
             </a:r>
           </a:p>
           <a:p>
@@ -3730,42 +3713,21 @@
               <a:buFont typeface="Arial" panose="020B0604020202020204" pitchFamily="34" charset="0"/>
               <a:buChar char="•"/>
             </a:pPr>
-            <a:r>
-              <a:rPr lang="pt-BR" sz="2000" dirty="0">
-                <a:latin typeface="Exo 2" panose="00000500000000000000" pitchFamily="50" charset="0"/>
-              </a:rPr>
-              <a:t>Empresa Inovadora</a:t>
-            </a:r>
+            <a:endParaRPr lang="pt-BR" sz="1600" dirty="0" smtClean="0"/>
           </a:p>
           <a:p>
             <a:pPr marL="285750" indent="-285750">
               <a:buFont typeface="Arial" panose="020B0604020202020204" pitchFamily="34" charset="0"/>
               <a:buChar char="•"/>
             </a:pPr>
-            <a:endParaRPr lang="pt-BR" sz="2000" dirty="0">
-              <a:latin typeface="Exo 2" panose="00000500000000000000" pitchFamily="50" charset="0"/>
-            </a:endParaRPr>
+            <a:endParaRPr lang="pt-BR" sz="1600" dirty="0"/>
           </a:p>
           <a:p>
             <a:pPr marL="285750" indent="-285750">
               <a:buFont typeface="Arial" panose="020B0604020202020204" pitchFamily="34" charset="0"/>
               <a:buChar char="•"/>
             </a:pPr>
-            <a:endParaRPr lang="pt-BR" dirty="0"/>
-          </a:p>
-          <a:p>
-            <a:pPr marL="285750" indent="-285750">
-              <a:buFont typeface="Arial" panose="020B0604020202020204" pitchFamily="34" charset="0"/>
-              <a:buChar char="•"/>
-            </a:pPr>
-            <a:endParaRPr lang="pt-BR" dirty="0"/>
-          </a:p>
-          <a:p>
-            <a:pPr marL="285750" indent="-285750">
-              <a:buFont typeface="Arial" panose="020B0604020202020204" pitchFamily="34" charset="0"/>
-              <a:buChar char="•"/>
-            </a:pPr>
-            <a:endParaRPr lang="pt-BR" dirty="0"/>
+            <a:endParaRPr lang="pt-BR" sz="1600" dirty="0"/>
           </a:p>
         </p:txBody>
       </p:sp>
@@ -3784,7 +3746,7 @@
         <p:spPr>
           <a:xfrm>
             <a:off x="717452" y="4700262"/>
-            <a:ext cx="8506061" cy="1908215"/>
+            <a:ext cx="11146300" cy="1938992"/>
           </a:xfrm>
           <a:prstGeom prst="rect">
             <a:avLst/>
@@ -3802,11 +3764,14 @@
               <a:buChar char="•"/>
             </a:pPr>
             <a:r>
-              <a:rPr lang="pt-BR" sz="2000" dirty="0">
+              <a:rPr lang="pt-BR" sz="2000" dirty="0" smtClean="0">
                 <a:latin typeface="Exo 2" panose="00000500000000000000" pitchFamily="50" charset="0"/>
               </a:rPr>
-              <a:t>Problemas e falhas recorrentes na segurança</a:t>
-            </a:r>
+              <a:t>Já sofreu com as consequências do vazamento de dados em sua empresa devido a falhas de sistemas de segurança </a:t>
+            </a:r>
+            <a:endParaRPr lang="pt-BR" sz="2000" dirty="0">
+              <a:latin typeface="Exo 2" panose="00000500000000000000" pitchFamily="50" charset="0"/>
+            </a:endParaRPr>
           </a:p>
           <a:p>
             <a:pPr marL="285750" indent="-285750">
@@ -3814,11 +3779,14 @@
               <a:buChar char="•"/>
             </a:pPr>
             <a:r>
-              <a:rPr lang="pt-BR" sz="2000" dirty="0">
+              <a:rPr lang="pt-BR" sz="2000" dirty="0" smtClean="0">
                 <a:latin typeface="Exo 2" panose="00000500000000000000" pitchFamily="50" charset="0"/>
               </a:rPr>
-              <a:t>Estar de acordo com as leis de privacidade (impostas pelo governo).</a:t>
-            </a:r>
+              <a:t>Precisa de redundância em seu sistemas de segurança para evitar riscos</a:t>
+            </a:r>
+            <a:endParaRPr lang="pt-BR" sz="2000" dirty="0">
+              <a:latin typeface="Exo 2" panose="00000500000000000000" pitchFamily="50" charset="0"/>
+            </a:endParaRPr>
           </a:p>
           <a:p>
             <a:pPr marL="285750" indent="-285750">
@@ -3826,11 +3794,14 @@
               <a:buChar char="•"/>
             </a:pPr>
             <a:r>
-              <a:rPr lang="pt-BR" sz="2000" dirty="0">
+              <a:rPr lang="pt-BR" sz="2000" dirty="0" smtClean="0">
                 <a:latin typeface="Exo 2" panose="00000500000000000000" pitchFamily="50" charset="0"/>
               </a:rPr>
-              <a:t>Falta de monitoramento no sistema de segurança</a:t>
-            </a:r>
+              <a:t>Quer focar em monitorar sua empresa e não em se preocupar se os sistemas estão funcionando</a:t>
+            </a:r>
+            <a:endParaRPr lang="pt-BR" sz="2000" dirty="0" smtClean="0">
+              <a:latin typeface="Exo 2" panose="00000500000000000000" pitchFamily="50" charset="0"/>
+            </a:endParaRPr>
           </a:p>
           <a:p>
             <a:pPr marL="285750" indent="-285750">
@@ -3838,29 +3809,11 @@
               <a:buChar char="•"/>
             </a:pPr>
             <a:r>
-              <a:rPr lang="pt-BR" sz="2000" dirty="0">
+              <a:rPr lang="pt-BR" sz="2000" dirty="0" smtClean="0">
                 <a:latin typeface="Exo 2" panose="00000500000000000000" pitchFamily="50" charset="0"/>
               </a:rPr>
-              <a:t>Redundância na segurança</a:t>
-            </a:r>
-          </a:p>
-          <a:p>
-            <a:pPr marL="285750" indent="-285750">
-              <a:buFont typeface="Arial" panose="020B0604020202020204" pitchFamily="34" charset="0"/>
-              <a:buChar char="•"/>
-            </a:pPr>
-            <a:r>
-              <a:rPr lang="pt-BR" sz="2000" dirty="0">
-                <a:latin typeface="Exo 2" panose="00000500000000000000" pitchFamily="50" charset="0"/>
-              </a:rPr>
-              <a:t>Redução de custos e riscos</a:t>
-            </a:r>
-          </a:p>
-          <a:p>
-            <a:pPr marL="285750" indent="-285750">
-              <a:buFont typeface="Arial" panose="020B0604020202020204" pitchFamily="34" charset="0"/>
-              <a:buChar char="•"/>
-            </a:pPr>
+              <a:t>Necessita de praticidade e rapidez em seu dia a dia</a:t>
+            </a:r>
             <a:endParaRPr lang="pt-BR" dirty="0"/>
           </a:p>
         </p:txBody>
@@ -3907,13 +3860,7 @@
       </p:sp>
       <p:pic>
         <p:nvPicPr>
-          <p:cNvPr id="1028" name="Picture 4" descr="Resultado de imagem para technology icon">
-            <a:extLst>
-              <a:ext uri="{FF2B5EF4-FFF2-40B4-BE49-F238E27FC236}">
-                <a16:creationId xmlns:a16="http://schemas.microsoft.com/office/drawing/2014/main" id="{9D344B7B-3926-400E-803B-769F96279CD1}"/>
-              </a:ext>
-            </a:extLst>
-          </p:cNvPr>
+          <p:cNvPr id="3" name="Picture 4" descr="Resultado de imagem para photo of male user"/>
           <p:cNvPicPr>
             <a:picLocks noChangeAspect="1" noChangeArrowheads="1"/>
           </p:cNvPicPr>
@@ -3934,55 +3881,8 @@
         </p:blipFill>
         <p:spPr bwMode="auto">
           <a:xfrm>
-            <a:off x="2453090" y="2498057"/>
-            <a:ext cx="455556" cy="455556"/>
-          </a:xfrm>
-          <a:prstGeom prst="rect">
-            <a:avLst/>
-          </a:prstGeom>
-          <a:noFill/>
-          <a:extLst>
-            <a:ext uri="{909E8E84-426E-40DD-AFC4-6F175D3DCCD1}">
-              <a14:hiddenFill xmlns:a14="http://schemas.microsoft.com/office/drawing/2010/main">
-                <a:solidFill>
-                  <a:srgbClr val="FFFFFF"/>
-                </a:solidFill>
-              </a14:hiddenFill>
-            </a:ext>
-          </a:extLst>
-        </p:spPr>
-      </p:pic>
-      <p:pic>
-        <p:nvPicPr>
-          <p:cNvPr id="1030" name="Picture 6" descr="Resultado de imagem para technology icon">
-            <a:extLst>
-              <a:ext uri="{FF2B5EF4-FFF2-40B4-BE49-F238E27FC236}">
-                <a16:creationId xmlns:a16="http://schemas.microsoft.com/office/drawing/2014/main" id="{60869F4E-A5DE-42DA-8E39-83E6188169E7}"/>
-              </a:ext>
-            </a:extLst>
-          </p:cNvPr>
-          <p:cNvPicPr>
-            <a:picLocks noChangeAspect="1" noChangeArrowheads="1"/>
-          </p:cNvPicPr>
-          <p:nvPr/>
-        </p:nvPicPr>
-        <p:blipFill>
-          <a:blip r:embed="rId3">
-            <a:extLst>
-              <a:ext uri="{28A0092B-C50C-407E-A947-70E740481C1C}">
-                <a14:useLocalDpi xmlns:a14="http://schemas.microsoft.com/office/drawing/2010/main" val="0"/>
-              </a:ext>
-            </a:extLst>
-          </a:blip>
-          <a:srcRect/>
-          <a:stretch>
-            <a:fillRect/>
-          </a:stretch>
-        </p:blipFill>
-        <p:spPr bwMode="auto">
-          <a:xfrm>
-            <a:off x="2810268" y="2027618"/>
-            <a:ext cx="1052235" cy="1052235"/>
+            <a:off x="3450672" y="1414517"/>
+            <a:ext cx="1916596" cy="1894136"/>
           </a:xfrm>
           <a:prstGeom prst="rect">
             <a:avLst/>
@@ -4009,6 +3909,13 @@
   <p:clrMapOvr>
     <a:masterClrMapping/>
   </p:clrMapOvr>
+  <p:timing>
+    <p:tnLst>
+      <p:par>
+        <p:cTn id="1" dur="indefinite" restart="never" nodeType="tmRoot"/>
+      </p:par>
+    </p:tnLst>
+  </p:timing>
 </p:sld>
 </file>
 

</xml_diff>

<commit_message>
Planilha de requisitos + modelo Lógico de BD
</commit_message>
<xml_diff>
--- a/Proto_Persona.pptx
+++ b/Proto_Persona.pptx
@@ -259,7 +259,7 @@
           <a:p>
             <a:fld id="{5769141A-6333-42BE-9110-89046F64AE2E}" type="datetimeFigureOut">
               <a:rPr lang="pt-BR" smtClean="0"/>
-              <a:t>04/09/2019</a:t>
+              <a:t>06/09/2019</a:t>
             </a:fld>
             <a:endParaRPr lang="pt-BR"/>
           </a:p>
@@ -457,7 +457,7 @@
           <a:p>
             <a:fld id="{5769141A-6333-42BE-9110-89046F64AE2E}" type="datetimeFigureOut">
               <a:rPr lang="pt-BR" smtClean="0"/>
-              <a:t>04/09/2019</a:t>
+              <a:t>06/09/2019</a:t>
             </a:fld>
             <a:endParaRPr lang="pt-BR"/>
           </a:p>
@@ -665,7 +665,7 @@
           <a:p>
             <a:fld id="{5769141A-6333-42BE-9110-89046F64AE2E}" type="datetimeFigureOut">
               <a:rPr lang="pt-BR" smtClean="0"/>
-              <a:t>04/09/2019</a:t>
+              <a:t>06/09/2019</a:t>
             </a:fld>
             <a:endParaRPr lang="pt-BR"/>
           </a:p>
@@ -863,7 +863,7 @@
           <a:p>
             <a:fld id="{5769141A-6333-42BE-9110-89046F64AE2E}" type="datetimeFigureOut">
               <a:rPr lang="pt-BR" smtClean="0"/>
-              <a:t>04/09/2019</a:t>
+              <a:t>06/09/2019</a:t>
             </a:fld>
             <a:endParaRPr lang="pt-BR"/>
           </a:p>
@@ -1138,7 +1138,7 @@
           <a:p>
             <a:fld id="{5769141A-6333-42BE-9110-89046F64AE2E}" type="datetimeFigureOut">
               <a:rPr lang="pt-BR" smtClean="0"/>
-              <a:t>04/09/2019</a:t>
+              <a:t>06/09/2019</a:t>
             </a:fld>
             <a:endParaRPr lang="pt-BR"/>
           </a:p>
@@ -1403,7 +1403,7 @@
           <a:p>
             <a:fld id="{5769141A-6333-42BE-9110-89046F64AE2E}" type="datetimeFigureOut">
               <a:rPr lang="pt-BR" smtClean="0"/>
-              <a:t>04/09/2019</a:t>
+              <a:t>06/09/2019</a:t>
             </a:fld>
             <a:endParaRPr lang="pt-BR"/>
           </a:p>
@@ -1815,7 +1815,7 @@
           <a:p>
             <a:fld id="{5769141A-6333-42BE-9110-89046F64AE2E}" type="datetimeFigureOut">
               <a:rPr lang="pt-BR" smtClean="0"/>
-              <a:t>04/09/2019</a:t>
+              <a:t>06/09/2019</a:t>
             </a:fld>
             <a:endParaRPr lang="pt-BR"/>
           </a:p>
@@ -1956,7 +1956,7 @@
           <a:p>
             <a:fld id="{5769141A-6333-42BE-9110-89046F64AE2E}" type="datetimeFigureOut">
               <a:rPr lang="pt-BR" smtClean="0"/>
-              <a:t>04/09/2019</a:t>
+              <a:t>06/09/2019</a:t>
             </a:fld>
             <a:endParaRPr lang="pt-BR"/>
           </a:p>
@@ -2069,7 +2069,7 @@
           <a:p>
             <a:fld id="{5769141A-6333-42BE-9110-89046F64AE2E}" type="datetimeFigureOut">
               <a:rPr lang="pt-BR" smtClean="0"/>
-              <a:t>04/09/2019</a:t>
+              <a:t>06/09/2019</a:t>
             </a:fld>
             <a:endParaRPr lang="pt-BR"/>
           </a:p>
@@ -2380,7 +2380,7 @@
           <a:p>
             <a:fld id="{5769141A-6333-42BE-9110-89046F64AE2E}" type="datetimeFigureOut">
               <a:rPr lang="pt-BR" smtClean="0"/>
-              <a:t>04/09/2019</a:t>
+              <a:t>06/09/2019</a:t>
             </a:fld>
             <a:endParaRPr lang="pt-BR"/>
           </a:p>
@@ -2668,7 +2668,7 @@
           <a:p>
             <a:fld id="{5769141A-6333-42BE-9110-89046F64AE2E}" type="datetimeFigureOut">
               <a:rPr lang="pt-BR" smtClean="0"/>
-              <a:t>04/09/2019</a:t>
+              <a:t>06/09/2019</a:t>
             </a:fld>
             <a:endParaRPr lang="pt-BR"/>
           </a:p>
@@ -2909,7 +2909,7 @@
           <a:p>
             <a:fld id="{5769141A-6333-42BE-9110-89046F64AE2E}" type="datetimeFigureOut">
               <a:rPr lang="pt-BR" smtClean="0"/>
-              <a:t>04/09/2019</a:t>
+              <a:t>06/09/2019</a:t>
             </a:fld>
             <a:endParaRPr lang="pt-BR"/>
           </a:p>
@@ -3395,14 +3395,11 @@
           <a:lstStyle/>
           <a:p>
             <a:r>
-              <a:rPr lang="pt-BR" sz="2000" b="1" dirty="0" smtClean="0">
+              <a:rPr lang="pt-BR" sz="2000" b="1" dirty="0">
                 <a:latin typeface="Exo 2" panose="00000500000000000000" pitchFamily="50" charset="0"/>
               </a:rPr>
               <a:t>José Ribeiro</a:t>
             </a:r>
-            <a:endParaRPr lang="pt-BR" sz="2000" b="1" dirty="0">
-              <a:latin typeface="Exo 2" panose="00000500000000000000" pitchFamily="50" charset="0"/>
-            </a:endParaRPr>
           </a:p>
         </p:txBody>
       </p:sp>
@@ -3576,7 +3573,7 @@
         </p:nvSpPr>
         <p:spPr>
           <a:xfrm>
-            <a:off x="717452" y="4330930"/>
+            <a:off x="717452" y="4038779"/>
             <a:ext cx="3406727" cy="369332"/>
           </a:xfrm>
           <a:prstGeom prst="rect">
@@ -3657,7 +3654,7 @@
         <p:spPr>
           <a:xfrm>
             <a:off x="6539132" y="1845319"/>
-            <a:ext cx="5324620" cy="1815882"/>
+            <a:ext cx="5324620" cy="2062103"/>
           </a:xfrm>
           <a:prstGeom prst="rect">
             <a:avLst/>
@@ -3675,14 +3672,11 @@
               <a:buChar char="•"/>
             </a:pPr>
             <a:r>
-              <a:rPr lang="pt-BR" sz="1600" dirty="0" smtClean="0"/>
-              <a:t>R</a:t>
-            </a:r>
-            <a:r>
-              <a:rPr lang="pt-BR" sz="1600" dirty="0" smtClean="0"/>
-              <a:t>esponsável pela segurança da informação de uma empresa de TI</a:t>
-            </a:r>
-            <a:endParaRPr lang="pt-BR" sz="1600" dirty="0"/>
+              <a:rPr lang="pt-BR" sz="2000" dirty="0">
+                <a:latin typeface="Exo 2" panose="00000500000000000000" pitchFamily="50" charset="0"/>
+              </a:rPr>
+              <a:t>Responsável pela segurança da informação de uma empresa de TI</a:t>
+            </a:r>
           </a:p>
           <a:p>
             <a:pPr marL="285750" indent="-285750">
@@ -3690,12 +3684,10 @@
               <a:buChar char="•"/>
             </a:pPr>
             <a:r>
-              <a:rPr lang="pt-BR" sz="1600" dirty="0"/>
-              <a:t>Lida com informações de alto </a:t>
-            </a:r>
-            <a:r>
-              <a:rPr lang="pt-BR" sz="1600" dirty="0" smtClean="0"/>
-              <a:t>sigilo</a:t>
+              <a:rPr lang="pt-BR" sz="2000" dirty="0">
+                <a:latin typeface="Exo 2" panose="00000500000000000000" pitchFamily="50" charset="0"/>
+              </a:rPr>
+              <a:t>Lida com informações de alto sigilo</a:t>
             </a:r>
           </a:p>
           <a:p>
@@ -3704,16 +3696,11 @@
               <a:buChar char="•"/>
             </a:pPr>
             <a:r>
-              <a:rPr lang="pt-BR" sz="1600" dirty="0" smtClean="0"/>
+              <a:rPr lang="pt-BR" sz="2000" dirty="0">
+                <a:latin typeface="Exo 2" panose="00000500000000000000" pitchFamily="50" charset="0"/>
+              </a:rPr>
               <a:t>Antenado em tecnologia</a:t>
             </a:r>
-          </a:p>
-          <a:p>
-            <a:pPr marL="285750" indent="-285750">
-              <a:buFont typeface="Arial" panose="020B0604020202020204" pitchFamily="34" charset="0"/>
-              <a:buChar char="•"/>
-            </a:pPr>
-            <a:endParaRPr lang="pt-BR" sz="1600" dirty="0" smtClean="0"/>
           </a:p>
           <a:p>
             <a:pPr marL="285750" indent="-285750">
@@ -3729,6 +3716,13 @@
             </a:pPr>
             <a:endParaRPr lang="pt-BR" sz="1600" dirty="0"/>
           </a:p>
+          <a:p>
+            <a:pPr marL="285750" indent="-285750">
+              <a:buFont typeface="Arial" panose="020B0604020202020204" pitchFamily="34" charset="0"/>
+              <a:buChar char="•"/>
+            </a:pPr>
+            <a:endParaRPr lang="pt-BR" sz="1600" dirty="0"/>
+          </a:p>
         </p:txBody>
       </p:sp>
       <p:sp>
@@ -3745,7 +3739,7 @@
         </p:nvSpPr>
         <p:spPr>
           <a:xfrm>
-            <a:off x="717452" y="4700262"/>
+            <a:off x="717452" y="4517607"/>
             <a:ext cx="11146300" cy="1938992"/>
           </a:xfrm>
           <a:prstGeom prst="rect">
@@ -3759,57 +3753,48 @@
           </a:bodyPr>
           <a:lstStyle/>
           <a:p>
-            <a:pPr marL="285750" indent="-285750">
+            <a:pPr marL="285750" indent="-285750" algn="just">
               <a:buFont typeface="Arial" panose="020B0604020202020204" pitchFamily="34" charset="0"/>
               <a:buChar char="•"/>
             </a:pPr>
             <a:r>
-              <a:rPr lang="pt-BR" sz="2000" dirty="0" smtClean="0">
+              <a:rPr lang="pt-BR" sz="2000" dirty="0">
                 <a:latin typeface="Exo 2" panose="00000500000000000000" pitchFamily="50" charset="0"/>
               </a:rPr>
               <a:t>Já sofreu com as consequências do vazamento de dados em sua empresa devido a falhas de sistemas de segurança </a:t>
             </a:r>
-            <a:endParaRPr lang="pt-BR" sz="2000" dirty="0">
-              <a:latin typeface="Exo 2" panose="00000500000000000000" pitchFamily="50" charset="0"/>
-            </a:endParaRPr>
-          </a:p>
-          <a:p>
-            <a:pPr marL="285750" indent="-285750">
+          </a:p>
+          <a:p>
+            <a:pPr marL="285750" indent="-285750" algn="just">
               <a:buFont typeface="Arial" panose="020B0604020202020204" pitchFamily="34" charset="0"/>
               <a:buChar char="•"/>
             </a:pPr>
             <a:r>
-              <a:rPr lang="pt-BR" sz="2000" dirty="0" smtClean="0">
+              <a:rPr lang="pt-BR" sz="2000" dirty="0">
                 <a:latin typeface="Exo 2" panose="00000500000000000000" pitchFamily="50" charset="0"/>
               </a:rPr>
               <a:t>Precisa de redundância em seu sistemas de segurança para evitar riscos</a:t>
             </a:r>
-            <a:endParaRPr lang="pt-BR" sz="2000" dirty="0">
-              <a:latin typeface="Exo 2" panose="00000500000000000000" pitchFamily="50" charset="0"/>
-            </a:endParaRPr>
-          </a:p>
-          <a:p>
-            <a:pPr marL="285750" indent="-285750">
+          </a:p>
+          <a:p>
+            <a:pPr marL="285750" indent="-285750" algn="just">
               <a:buFont typeface="Arial" panose="020B0604020202020204" pitchFamily="34" charset="0"/>
               <a:buChar char="•"/>
             </a:pPr>
             <a:r>
-              <a:rPr lang="pt-BR" sz="2000" dirty="0" smtClean="0">
+              <a:rPr lang="pt-BR" sz="2000" dirty="0">
                 <a:latin typeface="Exo 2" panose="00000500000000000000" pitchFamily="50" charset="0"/>
               </a:rPr>
               <a:t>Quer focar em monitorar sua empresa e não em se preocupar se os sistemas estão funcionando</a:t>
             </a:r>
-            <a:endParaRPr lang="pt-BR" sz="2000" dirty="0" smtClean="0">
-              <a:latin typeface="Exo 2" panose="00000500000000000000" pitchFamily="50" charset="0"/>
-            </a:endParaRPr>
-          </a:p>
-          <a:p>
-            <a:pPr marL="285750" indent="-285750">
+          </a:p>
+          <a:p>
+            <a:pPr marL="285750" indent="-285750" algn="just">
               <a:buFont typeface="Arial" panose="020B0604020202020204" pitchFamily="34" charset="0"/>
               <a:buChar char="•"/>
             </a:pPr>
             <a:r>
-              <a:rPr lang="pt-BR" sz="2000" dirty="0" smtClean="0">
+              <a:rPr lang="pt-BR" sz="2000" dirty="0">
                 <a:latin typeface="Exo 2" panose="00000500000000000000" pitchFamily="50" charset="0"/>
               </a:rPr>
               <a:t>Necessita de praticidade e rapidez em seu dia a dia</a:t>
@@ -3909,13 +3894,6 @@
   <p:clrMapOvr>
     <a:masterClrMapping/>
   </p:clrMapOvr>
-  <p:timing>
-    <p:tnLst>
-      <p:par>
-        <p:cTn id="1" dur="indefinite" restart="never" nodeType="tmRoot"/>
-      </p:par>
-    </p:tnLst>
-  </p:timing>
 </p:sld>
 </file>
 

</xml_diff>

<commit_message>
PPT com os Entregáveis do dia 11/09
</commit_message>
<xml_diff>
--- a/Proto_Persona.pptx
+++ b/Proto_Persona.pptx
@@ -5,7 +5,16 @@
     <p:sldMasterId id="2147483648" r:id="rId1"/>
   </p:sldMasterIdLst>
   <p:sldIdLst>
-    <p:sldId id="256" r:id="rId2"/>
+    <p:sldId id="265" r:id="rId2"/>
+    <p:sldId id="256" r:id="rId3"/>
+    <p:sldId id="262" r:id="rId4"/>
+    <p:sldId id="263" r:id="rId5"/>
+    <p:sldId id="260" r:id="rId6"/>
+    <p:sldId id="257" r:id="rId7"/>
+    <p:sldId id="258" r:id="rId8"/>
+    <p:sldId id="259" r:id="rId9"/>
+    <p:sldId id="264" r:id="rId10"/>
+    <p:sldId id="261" r:id="rId11"/>
   </p:sldIdLst>
   <p:sldSz cx="12192000" cy="6858000"/>
   <p:notesSz cx="6858000" cy="9144000"/>
@@ -259,7 +268,7 @@
           <a:p>
             <a:fld id="{5769141A-6333-42BE-9110-89046F64AE2E}" type="datetimeFigureOut">
               <a:rPr lang="pt-BR" smtClean="0"/>
-              <a:t>06/09/2019</a:t>
+              <a:t>10/09/2019</a:t>
             </a:fld>
             <a:endParaRPr lang="pt-BR"/>
           </a:p>
@@ -457,7 +466,7 @@
           <a:p>
             <a:fld id="{5769141A-6333-42BE-9110-89046F64AE2E}" type="datetimeFigureOut">
               <a:rPr lang="pt-BR" smtClean="0"/>
-              <a:t>06/09/2019</a:t>
+              <a:t>10/09/2019</a:t>
             </a:fld>
             <a:endParaRPr lang="pt-BR"/>
           </a:p>
@@ -665,7 +674,7 @@
           <a:p>
             <a:fld id="{5769141A-6333-42BE-9110-89046F64AE2E}" type="datetimeFigureOut">
               <a:rPr lang="pt-BR" smtClean="0"/>
-              <a:t>06/09/2019</a:t>
+              <a:t>10/09/2019</a:t>
             </a:fld>
             <a:endParaRPr lang="pt-BR"/>
           </a:p>
@@ -863,7 +872,7 @@
           <a:p>
             <a:fld id="{5769141A-6333-42BE-9110-89046F64AE2E}" type="datetimeFigureOut">
               <a:rPr lang="pt-BR" smtClean="0"/>
-              <a:t>06/09/2019</a:t>
+              <a:t>10/09/2019</a:t>
             </a:fld>
             <a:endParaRPr lang="pt-BR"/>
           </a:p>
@@ -1138,7 +1147,7 @@
           <a:p>
             <a:fld id="{5769141A-6333-42BE-9110-89046F64AE2E}" type="datetimeFigureOut">
               <a:rPr lang="pt-BR" smtClean="0"/>
-              <a:t>06/09/2019</a:t>
+              <a:t>10/09/2019</a:t>
             </a:fld>
             <a:endParaRPr lang="pt-BR"/>
           </a:p>
@@ -1403,7 +1412,7 @@
           <a:p>
             <a:fld id="{5769141A-6333-42BE-9110-89046F64AE2E}" type="datetimeFigureOut">
               <a:rPr lang="pt-BR" smtClean="0"/>
-              <a:t>06/09/2019</a:t>
+              <a:t>10/09/2019</a:t>
             </a:fld>
             <a:endParaRPr lang="pt-BR"/>
           </a:p>
@@ -1815,7 +1824,7 @@
           <a:p>
             <a:fld id="{5769141A-6333-42BE-9110-89046F64AE2E}" type="datetimeFigureOut">
               <a:rPr lang="pt-BR" smtClean="0"/>
-              <a:t>06/09/2019</a:t>
+              <a:t>10/09/2019</a:t>
             </a:fld>
             <a:endParaRPr lang="pt-BR"/>
           </a:p>
@@ -1956,7 +1965,7 @@
           <a:p>
             <a:fld id="{5769141A-6333-42BE-9110-89046F64AE2E}" type="datetimeFigureOut">
               <a:rPr lang="pt-BR" smtClean="0"/>
-              <a:t>06/09/2019</a:t>
+              <a:t>10/09/2019</a:t>
             </a:fld>
             <a:endParaRPr lang="pt-BR"/>
           </a:p>
@@ -2069,7 +2078,7 @@
           <a:p>
             <a:fld id="{5769141A-6333-42BE-9110-89046F64AE2E}" type="datetimeFigureOut">
               <a:rPr lang="pt-BR" smtClean="0"/>
-              <a:t>06/09/2019</a:t>
+              <a:t>10/09/2019</a:t>
             </a:fld>
             <a:endParaRPr lang="pt-BR"/>
           </a:p>
@@ -2380,7 +2389,7 @@
           <a:p>
             <a:fld id="{5769141A-6333-42BE-9110-89046F64AE2E}" type="datetimeFigureOut">
               <a:rPr lang="pt-BR" smtClean="0"/>
-              <a:t>06/09/2019</a:t>
+              <a:t>10/09/2019</a:t>
             </a:fld>
             <a:endParaRPr lang="pt-BR"/>
           </a:p>
@@ -2668,7 +2677,7 @@
           <a:p>
             <a:fld id="{5769141A-6333-42BE-9110-89046F64AE2E}" type="datetimeFigureOut">
               <a:rPr lang="pt-BR" smtClean="0"/>
-              <a:t>06/09/2019</a:t>
+              <a:t>10/09/2019</a:t>
             </a:fld>
             <a:endParaRPr lang="pt-BR"/>
           </a:p>
@@ -2909,7 +2918,7 @@
           <a:p>
             <a:fld id="{5769141A-6333-42BE-9110-89046F64AE2E}" type="datetimeFigureOut">
               <a:rPr lang="pt-BR" smtClean="0"/>
-              <a:t>06/09/2019</a:t>
+              <a:t>10/09/2019</a:t>
             </a:fld>
             <a:endParaRPr lang="pt-BR"/>
           </a:p>
@@ -3326,27 +3335,307 @@
           <a:chExt cx="0" cy="0"/>
         </a:xfrm>
       </p:grpSpPr>
-      <p:sp>
-        <p:nvSpPr>
-          <p:cNvPr id="4" name="CaixaDeTexto 3">
-            <a:extLst>
-              <a:ext uri="{FF2B5EF4-FFF2-40B4-BE49-F238E27FC236}">
-                <a16:creationId xmlns:a16="http://schemas.microsoft.com/office/drawing/2014/main" id="{36452D8A-E7B5-4743-A661-CA9E2D14CCE7}"/>
-              </a:ext>
-            </a:extLst>
-          </p:cNvPr>
-          <p:cNvSpPr txBox="1"/>
+      <p:pic>
+        <p:nvPicPr>
+          <p:cNvPr id="3074" name="Picture 2" descr="Resultado de imagem para planner microsoft icon">
+            <a:hlinkClick r:id="rId2"/>
+            <a:extLst>
+              <a:ext uri="{FF2B5EF4-FFF2-40B4-BE49-F238E27FC236}">
+                <a16:creationId xmlns:a16="http://schemas.microsoft.com/office/drawing/2014/main" id="{DCC76534-000A-48BA-837B-DC626F792F16}"/>
+              </a:ext>
+            </a:extLst>
+          </p:cNvPr>
+          <p:cNvPicPr>
+            <a:picLocks noChangeAspect="1" noChangeArrowheads="1"/>
+          </p:cNvPicPr>
           <p:nvPr/>
-        </p:nvSpPr>
-        <p:spPr>
-          <a:xfrm>
-            <a:off x="717452" y="1541099"/>
-            <a:ext cx="1547446" cy="369332"/>
+        </p:nvPicPr>
+        <p:blipFill>
+          <a:blip r:embed="rId3">
+            <a:extLst>
+              <a:ext uri="{28A0092B-C50C-407E-A947-70E740481C1C}">
+                <a14:useLocalDpi xmlns:a14="http://schemas.microsoft.com/office/drawing/2010/main" val="0"/>
+              </a:ext>
+            </a:extLst>
+          </a:blip>
+          <a:srcRect/>
+          <a:stretch>
+            <a:fillRect/>
+          </a:stretch>
+        </p:blipFill>
+        <p:spPr bwMode="auto">
+          <a:xfrm>
+            <a:off x="1602728" y="2486842"/>
+            <a:ext cx="2183251" cy="1695658"/>
           </a:xfrm>
           <a:prstGeom prst="rect">
             <a:avLst/>
           </a:prstGeom>
           <a:noFill/>
+          <a:extLst>
+            <a:ext uri="{909E8E84-426E-40DD-AFC4-6F175D3DCCD1}">
+              <a14:hiddenFill xmlns:a14="http://schemas.microsoft.com/office/drawing/2010/main">
+                <a:solidFill>
+                  <a:srgbClr val="FFFFFF"/>
+                </a:solidFill>
+              </a14:hiddenFill>
+            </a:ext>
+          </a:extLst>
+        </p:spPr>
+      </p:pic>
+      <p:pic>
+        <p:nvPicPr>
+          <p:cNvPr id="3080" name="Picture 8" descr="Resultado de imagem para github icon">
+            <a:hlinkClick r:id="rId4"/>
+            <a:extLst>
+              <a:ext uri="{FF2B5EF4-FFF2-40B4-BE49-F238E27FC236}">
+                <a16:creationId xmlns:a16="http://schemas.microsoft.com/office/drawing/2014/main" id="{25C0851C-8033-40C9-A785-924357AF901C}"/>
+              </a:ext>
+            </a:extLst>
+          </p:cNvPr>
+          <p:cNvPicPr>
+            <a:picLocks noChangeAspect="1" noChangeArrowheads="1"/>
+          </p:cNvPicPr>
+          <p:nvPr/>
+        </p:nvPicPr>
+        <p:blipFill>
+          <a:blip r:embed="rId5">
+            <a:extLst>
+              <a:ext uri="{28A0092B-C50C-407E-A947-70E740481C1C}">
+                <a14:useLocalDpi xmlns:a14="http://schemas.microsoft.com/office/drawing/2010/main" val="0"/>
+              </a:ext>
+            </a:extLst>
+          </a:blip>
+          <a:srcRect/>
+          <a:stretch>
+            <a:fillRect/>
+          </a:stretch>
+        </p:blipFill>
+        <p:spPr bwMode="auto">
+          <a:xfrm>
+            <a:off x="5369615" y="2514599"/>
+            <a:ext cx="1452770" cy="1452770"/>
+          </a:xfrm>
+          <a:prstGeom prst="rect">
+            <a:avLst/>
+          </a:prstGeom>
+          <a:noFill/>
+          <a:extLst>
+            <a:ext uri="{909E8E84-426E-40DD-AFC4-6F175D3DCCD1}">
+              <a14:hiddenFill xmlns:a14="http://schemas.microsoft.com/office/drawing/2010/main">
+                <a:solidFill>
+                  <a:srgbClr val="FFFFFF"/>
+                </a:solidFill>
+              </a14:hiddenFill>
+            </a:ext>
+          </a:extLst>
+        </p:spPr>
+      </p:pic>
+      <p:pic>
+        <p:nvPicPr>
+          <p:cNvPr id="3082" name="Picture 10" descr="Resultado de imagem para github icon">
+            <a:extLst>
+              <a:ext uri="{FF2B5EF4-FFF2-40B4-BE49-F238E27FC236}">
+                <a16:creationId xmlns:a16="http://schemas.microsoft.com/office/drawing/2014/main" id="{E3969A3E-31E6-414C-8342-A42A23998F72}"/>
+              </a:ext>
+            </a:extLst>
+          </p:cNvPr>
+          <p:cNvPicPr>
+            <a:picLocks noChangeAspect="1" noChangeArrowheads="1"/>
+          </p:cNvPicPr>
+          <p:nvPr/>
+        </p:nvPicPr>
+        <p:blipFill>
+          <a:blip r:embed="rId6">
+            <a:extLst>
+              <a:ext uri="{28A0092B-C50C-407E-A947-70E740481C1C}">
+                <a14:useLocalDpi xmlns:a14="http://schemas.microsoft.com/office/drawing/2010/main" val="0"/>
+              </a:ext>
+            </a:extLst>
+          </a:blip>
+          <a:srcRect/>
+          <a:stretch>
+            <a:fillRect/>
+          </a:stretch>
+        </p:blipFill>
+        <p:spPr bwMode="auto">
+          <a:xfrm>
+            <a:off x="5176630" y="4159211"/>
+            <a:ext cx="2046706" cy="505967"/>
+          </a:xfrm>
+          <a:prstGeom prst="rect">
+            <a:avLst/>
+          </a:prstGeom>
+          <a:noFill/>
+          <a:extLst>
+            <a:ext uri="{909E8E84-426E-40DD-AFC4-6F175D3DCCD1}">
+              <a14:hiddenFill xmlns:a14="http://schemas.microsoft.com/office/drawing/2010/main">
+                <a:solidFill>
+                  <a:srgbClr val="FFFFFF"/>
+                </a:solidFill>
+              </a14:hiddenFill>
+            </a:ext>
+          </a:extLst>
+        </p:spPr>
+      </p:pic>
+      <p:pic>
+        <p:nvPicPr>
+          <p:cNvPr id="3084" name="Picture 12" descr="Imagem relacionada">
+            <a:extLst>
+              <a:ext uri="{FF2B5EF4-FFF2-40B4-BE49-F238E27FC236}">
+                <a16:creationId xmlns:a16="http://schemas.microsoft.com/office/drawing/2014/main" id="{19AD249B-1329-44A6-87D4-062F13BDE175}"/>
+              </a:ext>
+            </a:extLst>
+          </p:cNvPr>
+          <p:cNvPicPr>
+            <a:picLocks noChangeAspect="1" noChangeArrowheads="1"/>
+          </p:cNvPicPr>
+          <p:nvPr/>
+        </p:nvPicPr>
+        <p:blipFill rotWithShape="1">
+          <a:blip r:embed="rId7">
+            <a:extLst>
+              <a:ext uri="{28A0092B-C50C-407E-A947-70E740481C1C}">
+                <a14:useLocalDpi xmlns:a14="http://schemas.microsoft.com/office/drawing/2010/main" val="0"/>
+              </a:ext>
+            </a:extLst>
+          </a:blip>
+          <a:srcRect l="46209" t="41691" r="20256" b="33292"/>
+          <a:stretch/>
+        </p:blipFill>
+        <p:spPr bwMode="auto">
+          <a:xfrm>
+            <a:off x="1947240" y="4182500"/>
+            <a:ext cx="1838739" cy="692789"/>
+          </a:xfrm>
+          <a:prstGeom prst="rect">
+            <a:avLst/>
+          </a:prstGeom>
+          <a:noFill/>
+          <a:extLst>
+            <a:ext uri="{909E8E84-426E-40DD-AFC4-6F175D3DCCD1}">
+              <a14:hiddenFill xmlns:a14="http://schemas.microsoft.com/office/drawing/2010/main">
+                <a:solidFill>
+                  <a:srgbClr val="FFFFFF"/>
+                </a:solidFill>
+              </a14:hiddenFill>
+            </a:ext>
+          </a:extLst>
+        </p:spPr>
+      </p:pic>
+      <p:pic>
+        <p:nvPicPr>
+          <p:cNvPr id="8" name="Picture 2" descr="Resultado de imagem para azure png">
+            <a:hlinkClick r:id="rId8"/>
+            <a:extLst>
+              <a:ext uri="{FF2B5EF4-FFF2-40B4-BE49-F238E27FC236}">
+                <a16:creationId xmlns:a16="http://schemas.microsoft.com/office/drawing/2014/main" id="{2AC5B454-3B54-4C51-867D-BAE5F9853A8D}"/>
+              </a:ext>
+            </a:extLst>
+          </p:cNvPr>
+          <p:cNvPicPr>
+            <a:picLocks noChangeAspect="1" noChangeArrowheads="1"/>
+          </p:cNvPicPr>
+          <p:nvPr/>
+        </p:nvPicPr>
+        <p:blipFill rotWithShape="1">
+          <a:blip r:embed="rId9">
+            <a:extLst>
+              <a:ext uri="{28A0092B-C50C-407E-A947-70E740481C1C}">
+                <a14:useLocalDpi xmlns:a14="http://schemas.microsoft.com/office/drawing/2010/main" val="0"/>
+              </a:ext>
+            </a:extLst>
+          </a:blip>
+          <a:srcRect l="39239" t="22781"/>
+          <a:stretch/>
+        </p:blipFill>
+        <p:spPr bwMode="auto">
+          <a:xfrm>
+            <a:off x="8918490" y="4159211"/>
+            <a:ext cx="1627844" cy="598003"/>
+          </a:xfrm>
+          <a:prstGeom prst="rect">
+            <a:avLst/>
+          </a:prstGeom>
+          <a:noFill/>
+          <a:extLst>
+            <a:ext uri="{909E8E84-426E-40DD-AFC4-6F175D3DCCD1}">
+              <a14:hiddenFill xmlns:a14="http://schemas.microsoft.com/office/drawing/2010/main">
+                <a:solidFill>
+                  <a:srgbClr val="FFFFFF"/>
+                </a:solidFill>
+              </a14:hiddenFill>
+            </a:ext>
+          </a:extLst>
+        </p:spPr>
+      </p:pic>
+      <p:pic>
+        <p:nvPicPr>
+          <p:cNvPr id="28" name="Picture 2" descr="Resultado de imagem para azure png">
+            <a:hlinkClick r:id="rId8"/>
+            <a:extLst>
+              <a:ext uri="{FF2B5EF4-FFF2-40B4-BE49-F238E27FC236}">
+                <a16:creationId xmlns:a16="http://schemas.microsoft.com/office/drawing/2014/main" id="{31DC45F7-35E2-472A-B458-D828E04F1987}"/>
+              </a:ext>
+            </a:extLst>
+          </p:cNvPr>
+          <p:cNvPicPr>
+            <a:picLocks noChangeAspect="1" noChangeArrowheads="1"/>
+          </p:cNvPicPr>
+          <p:nvPr/>
+        </p:nvPicPr>
+        <p:blipFill rotWithShape="1">
+          <a:blip r:embed="rId9">
+            <a:extLst>
+              <a:ext uri="{28A0092B-C50C-407E-A947-70E740481C1C}">
+                <a14:useLocalDpi xmlns:a14="http://schemas.microsoft.com/office/drawing/2010/main" val="0"/>
+              </a:ext>
+            </a:extLst>
+          </a:blip>
+          <a:srcRect r="60761"/>
+          <a:stretch/>
+        </p:blipFill>
+        <p:spPr bwMode="auto">
+          <a:xfrm>
+            <a:off x="8961427" y="2698789"/>
+            <a:ext cx="1627845" cy="1199194"/>
+          </a:xfrm>
+          <a:prstGeom prst="rect">
+            <a:avLst/>
+          </a:prstGeom>
+          <a:noFill/>
+          <a:extLst>
+            <a:ext uri="{909E8E84-426E-40DD-AFC4-6F175D3DCCD1}">
+              <a14:hiddenFill xmlns:a14="http://schemas.microsoft.com/office/drawing/2010/main">
+                <a:solidFill>
+                  <a:srgbClr val="FFFFFF"/>
+                </a:solidFill>
+              </a14:hiddenFill>
+            </a:ext>
+          </a:extLst>
+        </p:spPr>
+      </p:pic>
+      <p:sp>
+        <p:nvSpPr>
+          <p:cNvPr id="29" name="CaixaDeTexto 28">
+            <a:extLst>
+              <a:ext uri="{FF2B5EF4-FFF2-40B4-BE49-F238E27FC236}">
+                <a16:creationId xmlns:a16="http://schemas.microsoft.com/office/drawing/2014/main" id="{F9097F2B-6FC4-436D-AD25-DC09E4DE6218}"/>
+              </a:ext>
+            </a:extLst>
+          </p:cNvPr>
+          <p:cNvSpPr txBox="1"/>
+          <p:nvPr/>
+        </p:nvSpPr>
+        <p:spPr>
+          <a:xfrm>
+            <a:off x="717452" y="271716"/>
+            <a:ext cx="3607649" cy="600164"/>
+          </a:xfrm>
+          <a:prstGeom prst="rect">
+            <a:avLst/>
+          </a:prstGeom>
+          <a:noFill/>
         </p:spPr>
         <p:txBody>
           <a:bodyPr wrap="square" rtlCol="0">
@@ -3355,23 +3644,89 @@
           <a:lstStyle/>
           <a:p>
             <a:r>
-              <a:rPr lang="pt-BR" b="1" dirty="0">
-                <a:solidFill>
-                  <a:srgbClr val="FF0066"/>
+              <a:rPr lang="pt-BR" sz="3300" b="1" dirty="0">
+                <a:solidFill>
+                  <a:srgbClr val="00B0F0"/>
                 </a:solidFill>
                 <a:latin typeface="Exo 2" panose="00000500000000000000" pitchFamily="50" charset="0"/>
               </a:rPr>
-              <a:t>QUEM?</a:t>
-            </a:r>
-          </a:p>
-        </p:txBody>
-      </p:sp>
-      <p:sp>
-        <p:nvSpPr>
-          <p:cNvPr id="5" name="CaixaDeTexto 4">
-            <a:extLst>
-              <a:ext uri="{FF2B5EF4-FFF2-40B4-BE49-F238E27FC236}">
-                <a16:creationId xmlns:a16="http://schemas.microsoft.com/office/drawing/2014/main" id="{E26E76FB-726F-41B6-911C-A85FB7ED3C63}"/>
+              <a:t>Ferramentas</a:t>
+            </a:r>
+          </a:p>
+        </p:txBody>
+      </p:sp>
+    </p:spTree>
+    <p:extLst>
+      <p:ext uri="{BB962C8B-B14F-4D97-AF65-F5344CB8AC3E}">
+        <p14:creationId xmlns:p14="http://schemas.microsoft.com/office/powerpoint/2010/main" val="1626994494"/>
+      </p:ext>
+    </p:extLst>
+  </p:cSld>
+  <p:clrMapOvr>
+    <a:masterClrMapping/>
+  </p:clrMapOvr>
+</p:sld>
+</file>
+
+<file path=ppt/slides/slide10.xml><?xml version="1.0" encoding="utf-8"?>
+<p:sld xmlns:a="http://schemas.openxmlformats.org/drawingml/2006/main" xmlns:r="http://schemas.openxmlformats.org/officeDocument/2006/relationships" xmlns:p="http://schemas.openxmlformats.org/presentationml/2006/main">
+  <p:cSld>
+    <p:spTree>
+      <p:nvGrpSpPr>
+        <p:cNvPr id="1" name=""/>
+        <p:cNvGrpSpPr/>
+        <p:nvPr/>
+      </p:nvGrpSpPr>
+      <p:grpSpPr>
+        <a:xfrm>
+          <a:off x="0" y="0"/>
+          <a:ext cx="0" cy="0"/>
+          <a:chOff x="0" y="0"/>
+          <a:chExt cx="0" cy="0"/>
+        </a:xfrm>
+      </p:grpSpPr>
+      <p:pic>
+        <p:nvPicPr>
+          <p:cNvPr id="7" name="Imagem 6" descr="Uma imagem contendo captura de tela&#10;&#10;Descrição gerada automaticamente">
+            <a:extLst>
+              <a:ext uri="{FF2B5EF4-FFF2-40B4-BE49-F238E27FC236}">
+                <a16:creationId xmlns:a16="http://schemas.microsoft.com/office/drawing/2014/main" id="{E30BCA73-FA51-4798-90F2-D74578A88931}"/>
+              </a:ext>
+            </a:extLst>
+          </p:cNvPr>
+          <p:cNvPicPr>
+            <a:picLocks noChangeAspect="1"/>
+          </p:cNvPicPr>
+          <p:nvPr/>
+        </p:nvPicPr>
+        <p:blipFill>
+          <a:blip r:embed="rId2">
+            <a:extLst>
+              <a:ext uri="{28A0092B-C50C-407E-A947-70E740481C1C}">
+                <a14:useLocalDpi xmlns:a14="http://schemas.microsoft.com/office/drawing/2010/main" val="0"/>
+              </a:ext>
+            </a:extLst>
+          </a:blip>
+          <a:stretch>
+            <a:fillRect/>
+          </a:stretch>
+        </p:blipFill>
+        <p:spPr>
+          <a:xfrm>
+            <a:off x="1821671" y="0"/>
+            <a:ext cx="8548657" cy="6858000"/>
+          </a:xfrm>
+          <a:prstGeom prst="rect">
+            <a:avLst/>
+          </a:prstGeom>
+        </p:spPr>
+      </p:pic>
+      <p:sp>
+        <p:nvSpPr>
+          <p:cNvPr id="8" name="CaixaDeTexto 7">
+            <a:extLst>
+              <a:ext uri="{FF2B5EF4-FFF2-40B4-BE49-F238E27FC236}">
+                <a16:creationId xmlns:a16="http://schemas.microsoft.com/office/drawing/2014/main" id="{4D7AEAE6-2FFC-452C-8E42-21D57B2F3F2D}"/>
               </a:ext>
             </a:extLst>
           </p:cNvPr>
@@ -3380,8 +3735,8 @@
         </p:nvSpPr>
         <p:spPr>
           <a:xfrm>
-            <a:off x="717452" y="1861838"/>
-            <a:ext cx="2011680" cy="400110"/>
+            <a:off x="717452" y="271716"/>
+            <a:ext cx="3607649" cy="600164"/>
           </a:xfrm>
           <a:prstGeom prst="rect">
             <a:avLst/>
@@ -3395,6 +3750,164 @@
           <a:lstStyle/>
           <a:p>
             <a:r>
+              <a:rPr lang="pt-BR" sz="3300" b="1" dirty="0">
+                <a:solidFill>
+                  <a:srgbClr val="00B0F0"/>
+                </a:solidFill>
+                <a:latin typeface="Exo 2" panose="00000500000000000000" pitchFamily="50" charset="0"/>
+              </a:rPr>
+              <a:t>Diagrama de BD</a:t>
+            </a:r>
+          </a:p>
+        </p:txBody>
+      </p:sp>
+      <p:pic>
+        <p:nvPicPr>
+          <p:cNvPr id="2050" name="Picture 2" descr="Resultado de imagem para azure png">
+            <a:hlinkClick r:id="rId3"/>
+            <a:extLst>
+              <a:ext uri="{FF2B5EF4-FFF2-40B4-BE49-F238E27FC236}">
+                <a16:creationId xmlns:a16="http://schemas.microsoft.com/office/drawing/2014/main" id="{BFB29840-6666-498D-BE86-98009BB27EA7}"/>
+              </a:ext>
+            </a:extLst>
+          </p:cNvPr>
+          <p:cNvPicPr>
+            <a:picLocks noChangeAspect="1" noChangeArrowheads="1"/>
+          </p:cNvPicPr>
+          <p:nvPr/>
+        </p:nvPicPr>
+        <p:blipFill>
+          <a:blip r:embed="rId4">
+            <a:extLst>
+              <a:ext uri="{28A0092B-C50C-407E-A947-70E740481C1C}">
+                <a14:useLocalDpi xmlns:a14="http://schemas.microsoft.com/office/drawing/2010/main" val="0"/>
+              </a:ext>
+            </a:extLst>
+          </a:blip>
+          <a:srcRect/>
+          <a:stretch>
+            <a:fillRect/>
+          </a:stretch>
+        </p:blipFill>
+        <p:spPr bwMode="auto">
+          <a:xfrm>
+            <a:off x="10270435" y="6096000"/>
+            <a:ext cx="1729228" cy="499855"/>
+          </a:xfrm>
+          <a:prstGeom prst="rect">
+            <a:avLst/>
+          </a:prstGeom>
+          <a:noFill/>
+          <a:extLst>
+            <a:ext uri="{909E8E84-426E-40DD-AFC4-6F175D3DCCD1}">
+              <a14:hiddenFill xmlns:a14="http://schemas.microsoft.com/office/drawing/2010/main">
+                <a:solidFill>
+                  <a:srgbClr val="FFFFFF"/>
+                </a:solidFill>
+              </a14:hiddenFill>
+            </a:ext>
+          </a:extLst>
+        </p:spPr>
+      </p:pic>
+    </p:spTree>
+    <p:extLst>
+      <p:ext uri="{BB962C8B-B14F-4D97-AF65-F5344CB8AC3E}">
+        <p14:creationId xmlns:p14="http://schemas.microsoft.com/office/powerpoint/2010/main" val="1869083176"/>
+      </p:ext>
+    </p:extLst>
+  </p:cSld>
+  <p:clrMapOvr>
+    <a:masterClrMapping/>
+  </p:clrMapOvr>
+</p:sld>
+</file>
+
+<file path=ppt/slides/slide2.xml><?xml version="1.0" encoding="utf-8"?>
+<p:sld xmlns:a="http://schemas.openxmlformats.org/drawingml/2006/main" xmlns:r="http://schemas.openxmlformats.org/officeDocument/2006/relationships" xmlns:p="http://schemas.openxmlformats.org/presentationml/2006/main">
+  <p:cSld>
+    <p:spTree>
+      <p:nvGrpSpPr>
+        <p:cNvPr id="1" name=""/>
+        <p:cNvGrpSpPr/>
+        <p:nvPr/>
+      </p:nvGrpSpPr>
+      <p:grpSpPr>
+        <a:xfrm>
+          <a:off x="0" y="0"/>
+          <a:ext cx="0" cy="0"/>
+          <a:chOff x="0" y="0"/>
+          <a:chExt cx="0" cy="0"/>
+        </a:xfrm>
+      </p:grpSpPr>
+      <p:sp>
+        <p:nvSpPr>
+          <p:cNvPr id="4" name="CaixaDeTexto 3">
+            <a:extLst>
+              <a:ext uri="{FF2B5EF4-FFF2-40B4-BE49-F238E27FC236}">
+                <a16:creationId xmlns:a16="http://schemas.microsoft.com/office/drawing/2014/main" id="{36452D8A-E7B5-4743-A661-CA9E2D14CCE7}"/>
+              </a:ext>
+            </a:extLst>
+          </p:cNvPr>
+          <p:cNvSpPr txBox="1"/>
+          <p:nvPr/>
+        </p:nvSpPr>
+        <p:spPr>
+          <a:xfrm>
+            <a:off x="717452" y="1541099"/>
+            <a:ext cx="1547446" cy="369332"/>
+          </a:xfrm>
+          <a:prstGeom prst="rect">
+            <a:avLst/>
+          </a:prstGeom>
+          <a:noFill/>
+        </p:spPr>
+        <p:txBody>
+          <a:bodyPr wrap="square" rtlCol="0">
+            <a:spAutoFit/>
+          </a:bodyPr>
+          <a:lstStyle/>
+          <a:p>
+            <a:r>
+              <a:rPr lang="pt-BR" b="1" dirty="0">
+                <a:solidFill>
+                  <a:srgbClr val="FF0066"/>
+                </a:solidFill>
+                <a:latin typeface="Exo 2" panose="00000500000000000000" pitchFamily="50" charset="0"/>
+              </a:rPr>
+              <a:t>QUEM?</a:t>
+            </a:r>
+          </a:p>
+        </p:txBody>
+      </p:sp>
+      <p:sp>
+        <p:nvSpPr>
+          <p:cNvPr id="5" name="CaixaDeTexto 4">
+            <a:extLst>
+              <a:ext uri="{FF2B5EF4-FFF2-40B4-BE49-F238E27FC236}">
+                <a16:creationId xmlns:a16="http://schemas.microsoft.com/office/drawing/2014/main" id="{E26E76FB-726F-41B6-911C-A85FB7ED3C63}"/>
+              </a:ext>
+            </a:extLst>
+          </p:cNvPr>
+          <p:cNvSpPr txBox="1"/>
+          <p:nvPr/>
+        </p:nvSpPr>
+        <p:spPr>
+          <a:xfrm>
+            <a:off x="717452" y="1861838"/>
+            <a:ext cx="2011680" cy="400110"/>
+          </a:xfrm>
+          <a:prstGeom prst="rect">
+            <a:avLst/>
+          </a:prstGeom>
+          <a:noFill/>
+        </p:spPr>
+        <p:txBody>
+          <a:bodyPr wrap="square" rtlCol="0">
+            <a:spAutoFit/>
+          </a:bodyPr>
+          <a:lstStyle/>
+          <a:p>
+            <a:r>
               <a:rPr lang="pt-BR" sz="2000" b="1" dirty="0">
                 <a:latin typeface="Exo 2" panose="00000500000000000000" pitchFamily="50" charset="0"/>
               </a:rPr>
@@ -3417,8 +3930,8 @@
         </p:nvSpPr>
         <p:spPr>
           <a:xfrm>
-            <a:off x="328247" y="907339"/>
-            <a:ext cx="5603631" cy="2908495"/>
+            <a:off x="0" y="1032249"/>
+            <a:ext cx="5931878" cy="2908495"/>
           </a:xfrm>
           <a:prstGeom prst="rect">
             <a:avLst/>
@@ -3469,8 +3982,8 @@
         </p:nvSpPr>
         <p:spPr>
           <a:xfrm>
-            <a:off x="6260121" y="907338"/>
-            <a:ext cx="5603631" cy="2908495"/>
+            <a:off x="5931878" y="1032248"/>
+            <a:ext cx="6260120" cy="2908495"/>
           </a:xfrm>
           <a:prstGeom prst="rect">
             <a:avLst/>
@@ -3521,8 +4034,8 @@
         </p:nvSpPr>
         <p:spPr>
           <a:xfrm>
-            <a:off x="328247" y="3974068"/>
-            <a:ext cx="11535505" cy="2592027"/>
+            <a:off x="0" y="3974068"/>
+            <a:ext cx="12191999" cy="2852689"/>
           </a:xfrm>
           <a:prstGeom prst="rect">
             <a:avLst/>
@@ -3739,8 +4252,8 @@
         </p:nvSpPr>
         <p:spPr>
           <a:xfrm>
-            <a:off x="717452" y="4517607"/>
-            <a:ext cx="11146300" cy="1938992"/>
+            <a:off x="92765" y="4472822"/>
+            <a:ext cx="11770987" cy="1631216"/>
           </a:xfrm>
           <a:prstGeom prst="rect">
             <a:avLst/>
@@ -3817,8 +4330,8 @@
         </p:nvSpPr>
         <p:spPr>
           <a:xfrm>
-            <a:off x="254854" y="31243"/>
-            <a:ext cx="3607649" cy="584775"/>
+            <a:off x="717452" y="271716"/>
+            <a:ext cx="3607649" cy="600164"/>
           </a:xfrm>
           <a:prstGeom prst="rect">
             <a:avLst/>
@@ -3832,7 +4345,7 @@
           <a:lstStyle/>
           <a:p>
             <a:r>
-              <a:rPr lang="pt-BR" sz="3200" b="1" dirty="0">
+              <a:rPr lang="pt-BR" sz="3300" b="1" dirty="0">
                 <a:solidFill>
                   <a:srgbClr val="00B0F0"/>
                 </a:solidFill>
@@ -3888,6 +4401,2311 @@
     <p:extLst>
       <p:ext uri="{BB962C8B-B14F-4D97-AF65-F5344CB8AC3E}">
         <p14:creationId xmlns:p14="http://schemas.microsoft.com/office/powerpoint/2010/main" val="898681739"/>
+      </p:ext>
+    </p:extLst>
+  </p:cSld>
+  <p:clrMapOvr>
+    <a:masterClrMapping/>
+  </p:clrMapOvr>
+</p:sld>
+</file>
+
+<file path=ppt/slides/slide3.xml><?xml version="1.0" encoding="utf-8"?>
+<p:sld xmlns:a="http://schemas.openxmlformats.org/drawingml/2006/main" xmlns:r="http://schemas.openxmlformats.org/officeDocument/2006/relationships" xmlns:p="http://schemas.openxmlformats.org/presentationml/2006/main">
+  <p:cSld>
+    <p:bg>
+      <p:bgPr>
+        <a:solidFill>
+          <a:schemeClr val="bg1"/>
+        </a:solidFill>
+        <a:effectLst/>
+      </p:bgPr>
+    </p:bg>
+    <p:spTree>
+      <p:nvGrpSpPr>
+        <p:cNvPr id="1" name=""/>
+        <p:cNvGrpSpPr/>
+        <p:nvPr/>
+      </p:nvGrpSpPr>
+      <p:grpSpPr>
+        <a:xfrm>
+          <a:off x="0" y="0"/>
+          <a:ext cx="0" cy="0"/>
+          <a:chOff x="0" y="0"/>
+          <a:chExt cx="0" cy="0"/>
+        </a:xfrm>
+      </p:grpSpPr>
+      <p:pic>
+        <p:nvPicPr>
+          <p:cNvPr id="7" name="Imagem 6" descr="Uma imagem contendo texto, mapa&#10;&#10;Descrição gerada automaticamente">
+            <a:extLst>
+              <a:ext uri="{FF2B5EF4-FFF2-40B4-BE49-F238E27FC236}">
+                <a16:creationId xmlns:a16="http://schemas.microsoft.com/office/drawing/2014/main" id="{D696794E-610E-43AF-B5DF-3601CFF21CB6}"/>
+              </a:ext>
+            </a:extLst>
+          </p:cNvPr>
+          <p:cNvPicPr>
+            <a:picLocks noChangeAspect="1"/>
+          </p:cNvPicPr>
+          <p:nvPr/>
+        </p:nvPicPr>
+        <p:blipFill rotWithShape="1">
+          <a:blip r:embed="rId2">
+            <a:extLst>
+              <a:ext uri="{28A0092B-C50C-407E-A947-70E740481C1C}">
+                <a14:useLocalDpi xmlns:a14="http://schemas.microsoft.com/office/drawing/2010/main" val="0"/>
+              </a:ext>
+            </a:extLst>
+          </a:blip>
+          <a:srcRect l="74887" b="50145"/>
+          <a:stretch/>
+        </p:blipFill>
+        <p:spPr>
+          <a:xfrm>
+            <a:off x="776315" y="3571946"/>
+            <a:ext cx="2558661" cy="3225754"/>
+          </a:xfrm>
+          <a:prstGeom prst="rect">
+            <a:avLst/>
+          </a:prstGeom>
+        </p:spPr>
+      </p:pic>
+      <p:sp>
+        <p:nvSpPr>
+          <p:cNvPr id="13" name="Rectangle 12">
+            <a:extLst>
+              <a:ext uri="{FF2B5EF4-FFF2-40B4-BE49-F238E27FC236}">
+                <a16:creationId xmlns:a16="http://schemas.microsoft.com/office/drawing/2014/main" id="{E3B4FF89-C45F-4E24-B963-61E855708F2A}"/>
+              </a:ext>
+              <a:ext uri="{C183D7F6-B498-43B3-948B-1728B52AA6E4}">
+                <adec:decorative xmlns:adec="http://schemas.microsoft.com/office/drawing/2017/decorative" val="1"/>
+              </a:ext>
+            </a:extLst>
+          </p:cNvPr>
+          <p:cNvSpPr>
+            <a:spLocks noGrp="1" noRot="1" noChangeAspect="1" noMove="1" noResize="1" noEditPoints="1" noAdjustHandles="1" noChangeArrowheads="1" noChangeShapeType="1" noTextEdit="1"/>
+          </p:cNvSpPr>
+          <p:nvPr>
+            <p:extLst>
+              <p:ext uri="{386F3935-93C4-4BCD-93E2-E3B085C9AB24}">
+                <p16:designElem xmlns:p16="http://schemas.microsoft.com/office/powerpoint/2015/main" val="1"/>
+              </p:ext>
+            </p:extLst>
+          </p:nvPr>
+        </p:nvSpPr>
+        <p:spPr>
+          <a:xfrm>
+            <a:off x="4023671" y="0"/>
+            <a:ext cx="73152" cy="6858000"/>
+          </a:xfrm>
+          <a:prstGeom prst="rect">
+            <a:avLst/>
+          </a:prstGeom>
+          <a:solidFill>
+            <a:schemeClr val="tx1">
+              <a:lumMod val="75000"/>
+              <a:lumOff val="25000"/>
+            </a:schemeClr>
+          </a:solidFill>
+          <a:ln>
+            <a:noFill/>
+          </a:ln>
+        </p:spPr>
+        <p:style>
+          <a:lnRef idx="2">
+            <a:schemeClr val="accent1">
+              <a:shade val="50000"/>
+            </a:schemeClr>
+          </a:lnRef>
+          <a:fillRef idx="1">
+            <a:schemeClr val="accent1"/>
+          </a:fillRef>
+          <a:effectRef idx="0">
+            <a:schemeClr val="accent1"/>
+          </a:effectRef>
+          <a:fontRef idx="minor">
+            <a:schemeClr val="lt1"/>
+          </a:fontRef>
+        </p:style>
+        <p:txBody>
+          <a:bodyPr rtlCol="0" anchor="ctr"/>
+          <a:lstStyle/>
+          <a:p>
+            <a:pPr algn="ctr"/>
+            <a:endParaRPr lang="en-US"/>
+          </a:p>
+        </p:txBody>
+      </p:sp>
+      <p:pic>
+        <p:nvPicPr>
+          <p:cNvPr id="8" name="Imagem 7" descr="Uma imagem contendo texto, mapa&#10;&#10;Descrição gerada automaticamente">
+            <a:extLst>
+              <a:ext uri="{FF2B5EF4-FFF2-40B4-BE49-F238E27FC236}">
+                <a16:creationId xmlns:a16="http://schemas.microsoft.com/office/drawing/2014/main" id="{707FC8A7-01C5-4093-B36A-C5D6196E8C26}"/>
+              </a:ext>
+            </a:extLst>
+          </p:cNvPr>
+          <p:cNvPicPr>
+            <a:picLocks noChangeAspect="1"/>
+          </p:cNvPicPr>
+          <p:nvPr/>
+        </p:nvPicPr>
+        <p:blipFill rotWithShape="1">
+          <a:blip r:embed="rId2">
+            <a:extLst>
+              <a:ext uri="{28A0092B-C50C-407E-A947-70E740481C1C}">
+                <a14:useLocalDpi xmlns:a14="http://schemas.microsoft.com/office/drawing/2010/main" val="0"/>
+              </a:ext>
+            </a:extLst>
+          </a:blip>
+          <a:srcRect l="25403" t="48696" r="50269" b="266"/>
+          <a:stretch/>
+        </p:blipFill>
+        <p:spPr>
+          <a:xfrm>
+            <a:off x="8853026" y="3571945"/>
+            <a:ext cx="2480591" cy="3106534"/>
+          </a:xfrm>
+          <a:prstGeom prst="rect">
+            <a:avLst/>
+          </a:prstGeom>
+        </p:spPr>
+      </p:pic>
+      <p:sp>
+        <p:nvSpPr>
+          <p:cNvPr id="15" name="Rectangle 14">
+            <a:extLst>
+              <a:ext uri="{FF2B5EF4-FFF2-40B4-BE49-F238E27FC236}">
+                <a16:creationId xmlns:a16="http://schemas.microsoft.com/office/drawing/2014/main" id="{14F25C03-EF67-4344-8AEA-7B3FA0DED024}"/>
+              </a:ext>
+              <a:ext uri="{C183D7F6-B498-43B3-948B-1728B52AA6E4}">
+                <adec:decorative xmlns:adec="http://schemas.microsoft.com/office/drawing/2017/decorative" val="1"/>
+              </a:ext>
+            </a:extLst>
+          </p:cNvPr>
+          <p:cNvSpPr>
+            <a:spLocks noGrp="1" noRot="1" noChangeAspect="1" noMove="1" noResize="1" noEditPoints="1" noAdjustHandles="1" noChangeArrowheads="1" noChangeShapeType="1" noTextEdit="1"/>
+          </p:cNvSpPr>
+          <p:nvPr>
+            <p:extLst>
+              <p:ext uri="{386F3935-93C4-4BCD-93E2-E3B085C9AB24}">
+                <p16:designElem xmlns:p16="http://schemas.microsoft.com/office/powerpoint/2015/main" val="1"/>
+              </p:ext>
+            </p:extLst>
+          </p:nvPr>
+        </p:nvSpPr>
+        <p:spPr>
+          <a:xfrm>
+            <a:off x="8107836" y="0"/>
+            <a:ext cx="73152" cy="6858000"/>
+          </a:xfrm>
+          <a:prstGeom prst="rect">
+            <a:avLst/>
+          </a:prstGeom>
+          <a:solidFill>
+            <a:schemeClr val="tx1">
+              <a:lumMod val="75000"/>
+              <a:lumOff val="25000"/>
+            </a:schemeClr>
+          </a:solidFill>
+          <a:ln>
+            <a:noFill/>
+          </a:ln>
+        </p:spPr>
+        <p:style>
+          <a:lnRef idx="2">
+            <a:schemeClr val="accent1">
+              <a:shade val="50000"/>
+            </a:schemeClr>
+          </a:lnRef>
+          <a:fillRef idx="1">
+            <a:schemeClr val="accent1"/>
+          </a:fillRef>
+          <a:effectRef idx="0">
+            <a:schemeClr val="accent1"/>
+          </a:effectRef>
+          <a:fontRef idx="minor">
+            <a:schemeClr val="lt1"/>
+          </a:fontRef>
+        </p:style>
+        <p:txBody>
+          <a:bodyPr rtlCol="0" anchor="ctr"/>
+          <a:lstStyle/>
+          <a:p>
+            <a:pPr algn="ctr"/>
+            <a:endParaRPr lang="en-US"/>
+          </a:p>
+        </p:txBody>
+      </p:sp>
+      <p:pic>
+        <p:nvPicPr>
+          <p:cNvPr id="3" name="Imagem 2" descr="Uma imagem contendo texto, mapa&#10;&#10;Descrição gerada automaticamente">
+            <a:extLst>
+              <a:ext uri="{FF2B5EF4-FFF2-40B4-BE49-F238E27FC236}">
+                <a16:creationId xmlns:a16="http://schemas.microsoft.com/office/drawing/2014/main" id="{62E34D70-BDD0-4C5E-96DE-E9B0C0A76474}"/>
+              </a:ext>
+            </a:extLst>
+          </p:cNvPr>
+          <p:cNvPicPr>
+            <a:picLocks noChangeAspect="1"/>
+          </p:cNvPicPr>
+          <p:nvPr/>
+        </p:nvPicPr>
+        <p:blipFill rotWithShape="1">
+          <a:blip r:embed="rId2">
+            <a:extLst>
+              <a:ext uri="{28A0092B-C50C-407E-A947-70E740481C1C}">
+                <a14:useLocalDpi xmlns:a14="http://schemas.microsoft.com/office/drawing/2010/main" val="0"/>
+              </a:ext>
+            </a:extLst>
+          </a:blip>
+          <a:srcRect r="74067" b="50000"/>
+          <a:stretch/>
+        </p:blipFill>
+        <p:spPr>
+          <a:xfrm>
+            <a:off x="776315" y="73153"/>
+            <a:ext cx="2558661" cy="3212902"/>
+          </a:xfrm>
+          <a:prstGeom prst="rect">
+            <a:avLst/>
+          </a:prstGeom>
+        </p:spPr>
+      </p:pic>
+      <p:sp>
+        <p:nvSpPr>
+          <p:cNvPr id="17" name="Rectangle 16">
+            <a:extLst>
+              <a:ext uri="{FF2B5EF4-FFF2-40B4-BE49-F238E27FC236}">
+                <a16:creationId xmlns:a16="http://schemas.microsoft.com/office/drawing/2014/main" id="{F74793DE-3651-410B-B243-8F0B1468E6A4}"/>
+              </a:ext>
+              <a:ext uri="{C183D7F6-B498-43B3-948B-1728B52AA6E4}">
+                <adec:decorative xmlns:adec="http://schemas.microsoft.com/office/drawing/2017/decorative" val="1"/>
+              </a:ext>
+            </a:extLst>
+          </p:cNvPr>
+          <p:cNvSpPr>
+            <a:spLocks noGrp="1" noRot="1" noChangeAspect="1" noMove="1" noResize="1" noEditPoints="1" noAdjustHandles="1" noChangeArrowheads="1" noChangeShapeType="1" noTextEdit="1"/>
+          </p:cNvSpPr>
+          <p:nvPr>
+            <p:extLst>
+              <p:ext uri="{386F3935-93C4-4BCD-93E2-E3B085C9AB24}">
+                <p16:designElem xmlns:p16="http://schemas.microsoft.com/office/powerpoint/2015/main" val="1"/>
+              </p:ext>
+            </p:extLst>
+          </p:nvPr>
+        </p:nvSpPr>
+        <p:spPr>
+          <a:xfrm rot="5400000">
+            <a:off x="6059424" y="-2665476"/>
+            <a:ext cx="73152" cy="12188952"/>
+          </a:xfrm>
+          <a:prstGeom prst="rect">
+            <a:avLst/>
+          </a:prstGeom>
+          <a:solidFill>
+            <a:schemeClr val="tx1">
+              <a:lumMod val="75000"/>
+              <a:lumOff val="25000"/>
+            </a:schemeClr>
+          </a:solidFill>
+          <a:ln>
+            <a:noFill/>
+          </a:ln>
+        </p:spPr>
+        <p:style>
+          <a:lnRef idx="2">
+            <a:schemeClr val="accent1">
+              <a:shade val="50000"/>
+            </a:schemeClr>
+          </a:lnRef>
+          <a:fillRef idx="1">
+            <a:schemeClr val="accent1"/>
+          </a:fillRef>
+          <a:effectRef idx="0">
+            <a:schemeClr val="accent1"/>
+          </a:effectRef>
+          <a:fontRef idx="minor">
+            <a:schemeClr val="lt1"/>
+          </a:fontRef>
+        </p:style>
+        <p:txBody>
+          <a:bodyPr rtlCol="0" anchor="ctr"/>
+          <a:lstStyle/>
+          <a:p>
+            <a:pPr algn="ctr"/>
+            <a:endParaRPr lang="en-US"/>
+          </a:p>
+        </p:txBody>
+      </p:sp>
+      <p:pic>
+        <p:nvPicPr>
+          <p:cNvPr id="4" name="Imagem 3" descr="Uma imagem contendo texto, mapa&#10;&#10;Descrição gerada automaticamente">
+            <a:extLst>
+              <a:ext uri="{FF2B5EF4-FFF2-40B4-BE49-F238E27FC236}">
+                <a16:creationId xmlns:a16="http://schemas.microsoft.com/office/drawing/2014/main" id="{B2EA14C9-FE2F-4385-B5FE-DE957E255B11}"/>
+              </a:ext>
+            </a:extLst>
+          </p:cNvPr>
+          <p:cNvPicPr>
+            <a:picLocks noChangeAspect="1"/>
+          </p:cNvPicPr>
+          <p:nvPr/>
+        </p:nvPicPr>
+        <p:blipFill rotWithShape="1">
+          <a:blip r:embed="rId2">
+            <a:extLst>
+              <a:ext uri="{28A0092B-C50C-407E-A947-70E740481C1C}">
+                <a14:useLocalDpi xmlns:a14="http://schemas.microsoft.com/office/drawing/2010/main" val="0"/>
+              </a:ext>
+            </a:extLst>
+          </a:blip>
+          <a:srcRect l="25386" r="50000" b="50000"/>
+          <a:stretch/>
+        </p:blipFill>
+        <p:spPr>
+          <a:xfrm>
+            <a:off x="4936978" y="73153"/>
+            <a:ext cx="2496368" cy="3212902"/>
+          </a:xfrm>
+          <a:prstGeom prst="rect">
+            <a:avLst/>
+          </a:prstGeom>
+        </p:spPr>
+      </p:pic>
+      <p:pic>
+        <p:nvPicPr>
+          <p:cNvPr id="5" name="Imagem 4" descr="Uma imagem contendo texto, mapa&#10;&#10;Descrição gerada automaticamente">
+            <a:extLst>
+              <a:ext uri="{FF2B5EF4-FFF2-40B4-BE49-F238E27FC236}">
+                <a16:creationId xmlns:a16="http://schemas.microsoft.com/office/drawing/2014/main" id="{45929F10-4F32-4DD1-B689-FB81DC17C7EC}"/>
+              </a:ext>
+            </a:extLst>
+          </p:cNvPr>
+          <p:cNvPicPr>
+            <a:picLocks noChangeAspect="1"/>
+          </p:cNvPicPr>
+          <p:nvPr/>
+        </p:nvPicPr>
+        <p:blipFill rotWithShape="1">
+          <a:blip r:embed="rId2">
+            <a:extLst>
+              <a:ext uri="{28A0092B-C50C-407E-A947-70E740481C1C}">
+                <a14:useLocalDpi xmlns:a14="http://schemas.microsoft.com/office/drawing/2010/main" val="0"/>
+              </a:ext>
+            </a:extLst>
+          </a:blip>
+          <a:srcRect l="50000" r="24429" b="50000"/>
+          <a:stretch/>
+        </p:blipFill>
+        <p:spPr>
+          <a:xfrm>
+            <a:off x="8853027" y="73153"/>
+            <a:ext cx="2480590" cy="3212902"/>
+          </a:xfrm>
+          <a:prstGeom prst="rect">
+            <a:avLst/>
+          </a:prstGeom>
+        </p:spPr>
+      </p:pic>
+      <p:pic>
+        <p:nvPicPr>
+          <p:cNvPr id="6" name="Imagem 5" descr="Uma imagem contendo texto, mapa&#10;&#10;Descrição gerada automaticamente">
+            <a:extLst>
+              <a:ext uri="{FF2B5EF4-FFF2-40B4-BE49-F238E27FC236}">
+                <a16:creationId xmlns:a16="http://schemas.microsoft.com/office/drawing/2014/main" id="{B3F092D5-34A1-4A13-B1B1-CF169633DABA}"/>
+              </a:ext>
+            </a:extLst>
+          </p:cNvPr>
+          <p:cNvPicPr>
+            <a:picLocks noChangeAspect="1"/>
+          </p:cNvPicPr>
+          <p:nvPr/>
+        </p:nvPicPr>
+        <p:blipFill rotWithShape="1">
+          <a:blip r:embed="rId2">
+            <a:extLst>
+              <a:ext uri="{28A0092B-C50C-407E-A947-70E740481C1C}">
+                <a14:useLocalDpi xmlns:a14="http://schemas.microsoft.com/office/drawing/2010/main" val="0"/>
+              </a:ext>
+            </a:extLst>
+          </a:blip>
+          <a:srcRect t="50000" r="74887"/>
+          <a:stretch/>
+        </p:blipFill>
+        <p:spPr>
+          <a:xfrm>
+            <a:off x="4936978" y="3571946"/>
+            <a:ext cx="2496368" cy="3128658"/>
+          </a:xfrm>
+          <a:prstGeom prst="rect">
+            <a:avLst/>
+          </a:prstGeom>
+        </p:spPr>
+      </p:pic>
+    </p:spTree>
+    <p:extLst>
+      <p:ext uri="{BB962C8B-B14F-4D97-AF65-F5344CB8AC3E}">
+        <p14:creationId xmlns:p14="http://schemas.microsoft.com/office/powerpoint/2010/main" val="3350438725"/>
+      </p:ext>
+    </p:extLst>
+  </p:cSld>
+  <p:clrMapOvr>
+    <a:masterClrMapping/>
+  </p:clrMapOvr>
+</p:sld>
+</file>
+
+<file path=ppt/slides/slide4.xml><?xml version="1.0" encoding="utf-8"?>
+<p:sld xmlns:a="http://schemas.openxmlformats.org/drawingml/2006/main" xmlns:r="http://schemas.openxmlformats.org/officeDocument/2006/relationships" xmlns:p="http://schemas.openxmlformats.org/presentationml/2006/main">
+  <p:cSld>
+    <p:bg>
+      <p:bgPr>
+        <a:solidFill>
+          <a:schemeClr val="bg1"/>
+        </a:solidFill>
+        <a:effectLst/>
+      </p:bgPr>
+    </p:bg>
+    <p:spTree>
+      <p:nvGrpSpPr>
+        <p:cNvPr id="1" name=""/>
+        <p:cNvGrpSpPr/>
+        <p:nvPr/>
+      </p:nvGrpSpPr>
+      <p:grpSpPr>
+        <a:xfrm>
+          <a:off x="0" y="0"/>
+          <a:ext cx="0" cy="0"/>
+          <a:chOff x="0" y="0"/>
+          <a:chExt cx="0" cy="0"/>
+        </a:xfrm>
+      </p:grpSpPr>
+      <p:sp>
+        <p:nvSpPr>
+          <p:cNvPr id="28" name="Rectangle 21">
+            <a:extLst>
+              <a:ext uri="{FF2B5EF4-FFF2-40B4-BE49-F238E27FC236}">
+                <a16:creationId xmlns:a16="http://schemas.microsoft.com/office/drawing/2014/main" id="{A9F529C3-C941-49FD-8C67-82F134F64BDB}"/>
+              </a:ext>
+              <a:ext uri="{C183D7F6-B498-43B3-948B-1728B52AA6E4}">
+                <adec:decorative xmlns:adec="http://schemas.microsoft.com/office/drawing/2017/decorative" val="1"/>
+              </a:ext>
+            </a:extLst>
+          </p:cNvPr>
+          <p:cNvSpPr>
+            <a:spLocks noGrp="1" noRot="1" noChangeAspect="1" noMove="1" noResize="1" noEditPoints="1" noAdjustHandles="1" noChangeArrowheads="1" noChangeShapeType="1" noTextEdit="1"/>
+          </p:cNvSpPr>
+          <p:nvPr>
+            <p:extLst>
+              <p:ext uri="{386F3935-93C4-4BCD-93E2-E3B085C9AB24}">
+                <p16:designElem xmlns:p16="http://schemas.microsoft.com/office/powerpoint/2015/main" val="1"/>
+              </p:ext>
+            </p:extLst>
+          </p:nvPr>
+        </p:nvSpPr>
+        <p:spPr>
+          <a:xfrm>
+            <a:off x="0" y="0"/>
+            <a:ext cx="12192000" cy="6858000"/>
+          </a:xfrm>
+          <a:prstGeom prst="rect">
+            <a:avLst/>
+          </a:prstGeom>
+          <a:solidFill>
+            <a:schemeClr val="tx1">
+              <a:lumMod val="50000"/>
+              <a:lumOff val="50000"/>
+              <a:alpha val="30000"/>
+            </a:schemeClr>
+          </a:solidFill>
+          <a:ln>
+            <a:noFill/>
+          </a:ln>
+        </p:spPr>
+        <p:style>
+          <a:lnRef idx="2">
+            <a:schemeClr val="accent1">
+              <a:shade val="50000"/>
+            </a:schemeClr>
+          </a:lnRef>
+          <a:fillRef idx="1">
+            <a:schemeClr val="accent1"/>
+          </a:fillRef>
+          <a:effectRef idx="0">
+            <a:schemeClr val="accent1"/>
+          </a:effectRef>
+          <a:fontRef idx="minor">
+            <a:schemeClr val="lt1"/>
+          </a:fontRef>
+        </p:style>
+        <p:txBody>
+          <a:bodyPr rtlCol="0" anchor="ctr"/>
+          <a:lstStyle/>
+          <a:p>
+            <a:pPr algn="ctr"/>
+            <a:endParaRPr lang="en-US"/>
+          </a:p>
+        </p:txBody>
+      </p:sp>
+      <p:sp>
+        <p:nvSpPr>
+          <p:cNvPr id="29" name="Rectangle 23">
+            <a:extLst>
+              <a:ext uri="{FF2B5EF4-FFF2-40B4-BE49-F238E27FC236}">
+                <a16:creationId xmlns:a16="http://schemas.microsoft.com/office/drawing/2014/main" id="{20586029-32A0-47E5-9AEC-AE3ABA6B94D0}"/>
+              </a:ext>
+              <a:ext uri="{C183D7F6-B498-43B3-948B-1728B52AA6E4}">
+                <adec:decorative xmlns:adec="http://schemas.microsoft.com/office/drawing/2017/decorative" val="1"/>
+              </a:ext>
+            </a:extLst>
+          </p:cNvPr>
+          <p:cNvSpPr>
+            <a:spLocks noGrp="1" noRot="1" noChangeAspect="1" noMove="1" noResize="1" noEditPoints="1" noAdjustHandles="1" noChangeArrowheads="1" noChangeShapeType="1" noTextEdit="1"/>
+          </p:cNvSpPr>
+          <p:nvPr>
+            <p:extLst>
+              <p:ext uri="{386F3935-93C4-4BCD-93E2-E3B085C9AB24}">
+                <p16:designElem xmlns:p16="http://schemas.microsoft.com/office/powerpoint/2015/main" val="1"/>
+              </p:ext>
+            </p:extLst>
+          </p:nvPr>
+        </p:nvSpPr>
+        <p:spPr>
+          <a:xfrm>
+            <a:off x="477012" y="480060"/>
+            <a:ext cx="11237976" cy="5897880"/>
+          </a:xfrm>
+          <a:prstGeom prst="rect">
+            <a:avLst/>
+          </a:prstGeom>
+          <a:solidFill>
+            <a:srgbClr val="FFFFFF"/>
+          </a:solidFill>
+          <a:ln w="9525">
+            <a:noFill/>
+          </a:ln>
+          <a:effectLst>
+            <a:outerShdw blurRad="63500" dist="17780" dir="5400000" algn="t" rotWithShape="0">
+              <a:prstClr val="black">
+                <a:alpha val="43000"/>
+              </a:prstClr>
+            </a:outerShdw>
+          </a:effectLst>
+        </p:spPr>
+        <p:style>
+          <a:lnRef idx="2">
+            <a:schemeClr val="accent1">
+              <a:shade val="50000"/>
+            </a:schemeClr>
+          </a:lnRef>
+          <a:fillRef idx="1">
+            <a:schemeClr val="accent1"/>
+          </a:fillRef>
+          <a:effectRef idx="0">
+            <a:schemeClr val="accent1"/>
+          </a:effectRef>
+          <a:fontRef idx="minor">
+            <a:schemeClr val="lt1"/>
+          </a:fontRef>
+        </p:style>
+        <p:txBody>
+          <a:bodyPr rtlCol="0" anchor="ctr"/>
+          <a:lstStyle/>
+          <a:p>
+            <a:pPr algn="ctr"/>
+            <a:endParaRPr lang="en-US"/>
+          </a:p>
+        </p:txBody>
+      </p:sp>
+      <p:pic>
+        <p:nvPicPr>
+          <p:cNvPr id="12" name="Imagem 11" descr="Uma imagem contendo texto, mapa&#10;&#10;Descrição gerada automaticamente">
+            <a:extLst>
+              <a:ext uri="{FF2B5EF4-FFF2-40B4-BE49-F238E27FC236}">
+                <a16:creationId xmlns:a16="http://schemas.microsoft.com/office/drawing/2014/main" id="{BB1F9D55-9C31-4757-85CC-9CF61C8F9C6B}"/>
+              </a:ext>
+            </a:extLst>
+          </p:cNvPr>
+          <p:cNvPicPr>
+            <a:picLocks noChangeAspect="1"/>
+          </p:cNvPicPr>
+          <p:nvPr/>
+        </p:nvPicPr>
+        <p:blipFill rotWithShape="1">
+          <a:blip r:embed="rId2">
+            <a:extLst>
+              <a:ext uri="{28A0092B-C50C-407E-A947-70E740481C1C}">
+                <a14:useLocalDpi xmlns:a14="http://schemas.microsoft.com/office/drawing/2010/main" val="0"/>
+              </a:ext>
+            </a:extLst>
+          </a:blip>
+          <a:srcRect l="75161" t="50000"/>
+          <a:stretch/>
+        </p:blipFill>
+        <p:spPr>
+          <a:xfrm>
+            <a:off x="1334926" y="643466"/>
+            <a:ext cx="3911798" cy="5571066"/>
+          </a:xfrm>
+          <a:prstGeom prst="rect">
+            <a:avLst/>
+          </a:prstGeom>
+        </p:spPr>
+      </p:pic>
+      <p:cxnSp>
+        <p:nvCxnSpPr>
+          <p:cNvPr id="30" name="Straight Connector 25">
+            <a:extLst>
+              <a:ext uri="{FF2B5EF4-FFF2-40B4-BE49-F238E27FC236}">
+                <a16:creationId xmlns:a16="http://schemas.microsoft.com/office/drawing/2014/main" id="{8C730EAB-A532-4295-A302-FB4B90DB9F5E}"/>
+              </a:ext>
+              <a:ext uri="{C183D7F6-B498-43B3-948B-1728B52AA6E4}">
+                <adec:decorative xmlns:adec="http://schemas.microsoft.com/office/drawing/2017/decorative" val="1"/>
+              </a:ext>
+            </a:extLst>
+          </p:cNvPr>
+          <p:cNvCxnSpPr>
+            <a:cxnSpLocks noGrp="1" noRot="1" noChangeAspect="1" noMove="1" noResize="1" noEditPoints="1" noAdjustHandles="1" noChangeArrowheads="1" noChangeShapeType="1"/>
+          </p:cNvCxnSpPr>
+          <p:nvPr>
+            <p:extLst>
+              <p:ext uri="{386F3935-93C4-4BCD-93E2-E3B085C9AB24}">
+                <p16:designElem xmlns:p16="http://schemas.microsoft.com/office/powerpoint/2015/main" val="1"/>
+              </p:ext>
+            </p:extLst>
+          </p:nvPr>
+        </p:nvCxnSpPr>
+        <p:spPr>
+          <a:xfrm>
+            <a:off x="6079958" y="1143000"/>
+            <a:ext cx="0" cy="4572000"/>
+          </a:xfrm>
+          <a:prstGeom prst="line">
+            <a:avLst/>
+          </a:prstGeom>
+          <a:ln>
+            <a:solidFill>
+              <a:srgbClr val="4E4E4E"/>
+            </a:solidFill>
+          </a:ln>
+        </p:spPr>
+        <p:style>
+          <a:lnRef idx="1">
+            <a:schemeClr val="accent1"/>
+          </a:lnRef>
+          <a:fillRef idx="0">
+            <a:schemeClr val="accent1"/>
+          </a:fillRef>
+          <a:effectRef idx="0">
+            <a:schemeClr val="accent1"/>
+          </a:effectRef>
+          <a:fontRef idx="minor">
+            <a:schemeClr val="tx1"/>
+          </a:fontRef>
+        </p:style>
+      </p:cxnSp>
+      <p:pic>
+        <p:nvPicPr>
+          <p:cNvPr id="11" name="Imagem 10" descr="Uma imagem contendo texto, mapa&#10;&#10;Descrição gerada automaticamente">
+            <a:extLst>
+              <a:ext uri="{FF2B5EF4-FFF2-40B4-BE49-F238E27FC236}">
+                <a16:creationId xmlns:a16="http://schemas.microsoft.com/office/drawing/2014/main" id="{FAEF17E1-95B5-468E-A73F-BA1CDACBE011}"/>
+              </a:ext>
+            </a:extLst>
+          </p:cNvPr>
+          <p:cNvPicPr>
+            <a:picLocks noChangeAspect="1"/>
+          </p:cNvPicPr>
+          <p:nvPr/>
+        </p:nvPicPr>
+        <p:blipFill rotWithShape="1">
+          <a:blip r:embed="rId2">
+            <a:extLst>
+              <a:ext uri="{28A0092B-C50C-407E-A947-70E740481C1C}">
+                <a14:useLocalDpi xmlns:a14="http://schemas.microsoft.com/office/drawing/2010/main" val="0"/>
+              </a:ext>
+            </a:extLst>
+          </a:blip>
+          <a:srcRect l="50000" t="50000" r="24839"/>
+          <a:stretch/>
+        </p:blipFill>
+        <p:spPr>
+          <a:xfrm>
+            <a:off x="6919927" y="643467"/>
+            <a:ext cx="3962495" cy="5571066"/>
+          </a:xfrm>
+          <a:prstGeom prst="rect">
+            <a:avLst/>
+          </a:prstGeom>
+        </p:spPr>
+      </p:pic>
+      <p:cxnSp>
+        <p:nvCxnSpPr>
+          <p:cNvPr id="9" name="Conector reto 8">
+            <a:extLst>
+              <a:ext uri="{FF2B5EF4-FFF2-40B4-BE49-F238E27FC236}">
+                <a16:creationId xmlns:a16="http://schemas.microsoft.com/office/drawing/2014/main" id="{75049D49-6AB5-418E-9854-060432B7B1A5}"/>
+              </a:ext>
+            </a:extLst>
+          </p:cNvPr>
+          <p:cNvCxnSpPr>
+            <a:cxnSpLocks/>
+          </p:cNvCxnSpPr>
+          <p:nvPr/>
+        </p:nvCxnSpPr>
+        <p:spPr>
+          <a:xfrm>
+            <a:off x="6079958" y="480060"/>
+            <a:ext cx="0" cy="5897880"/>
+          </a:xfrm>
+          <a:prstGeom prst="line">
+            <a:avLst/>
+          </a:prstGeom>
+          <a:ln w="76200">
+            <a:solidFill>
+              <a:schemeClr val="tx1">
+                <a:lumMod val="75000"/>
+                <a:lumOff val="25000"/>
+              </a:schemeClr>
+            </a:solidFill>
+          </a:ln>
+        </p:spPr>
+        <p:style>
+          <a:lnRef idx="3">
+            <a:schemeClr val="dk1"/>
+          </a:lnRef>
+          <a:fillRef idx="0">
+            <a:schemeClr val="dk1"/>
+          </a:fillRef>
+          <a:effectRef idx="2">
+            <a:schemeClr val="dk1"/>
+          </a:effectRef>
+          <a:fontRef idx="minor">
+            <a:schemeClr val="tx1"/>
+          </a:fontRef>
+        </p:style>
+      </p:cxnSp>
+    </p:spTree>
+    <p:extLst>
+      <p:ext uri="{BB962C8B-B14F-4D97-AF65-F5344CB8AC3E}">
+        <p14:creationId xmlns:p14="http://schemas.microsoft.com/office/powerpoint/2010/main" val="3688458570"/>
+      </p:ext>
+    </p:extLst>
+  </p:cSld>
+  <p:clrMapOvr>
+    <a:masterClrMapping/>
+  </p:clrMapOvr>
+</p:sld>
+</file>
+
+<file path=ppt/slides/slide5.xml><?xml version="1.0" encoding="utf-8"?>
+<p:sld xmlns:a="http://schemas.openxmlformats.org/drawingml/2006/main" xmlns:r="http://schemas.openxmlformats.org/officeDocument/2006/relationships" xmlns:p="http://schemas.openxmlformats.org/presentationml/2006/main">
+  <p:cSld>
+    <p:spTree>
+      <p:nvGrpSpPr>
+        <p:cNvPr id="1" name=""/>
+        <p:cNvGrpSpPr/>
+        <p:nvPr/>
+      </p:nvGrpSpPr>
+      <p:grpSpPr>
+        <a:xfrm>
+          <a:off x="0" y="0"/>
+          <a:ext cx="0" cy="0"/>
+          <a:chOff x="0" y="0"/>
+          <a:chExt cx="0" cy="0"/>
+        </a:xfrm>
+      </p:grpSpPr>
+      <p:pic>
+        <p:nvPicPr>
+          <p:cNvPr id="3" name="Imagem 2" descr="Uma imagem contendo captura de tela&#10;&#10;Descrição gerada automaticamente">
+            <a:extLst>
+              <a:ext uri="{FF2B5EF4-FFF2-40B4-BE49-F238E27FC236}">
+                <a16:creationId xmlns:a16="http://schemas.microsoft.com/office/drawing/2014/main" id="{58490392-F357-4420-BBC4-EB8A90BE1A39}"/>
+              </a:ext>
+            </a:extLst>
+          </p:cNvPr>
+          <p:cNvPicPr>
+            <a:picLocks noChangeAspect="1"/>
+          </p:cNvPicPr>
+          <p:nvPr/>
+        </p:nvPicPr>
+        <p:blipFill>
+          <a:blip r:embed="rId2">
+            <a:extLst>
+              <a:ext uri="{28A0092B-C50C-407E-A947-70E740481C1C}">
+                <a14:useLocalDpi xmlns:a14="http://schemas.microsoft.com/office/drawing/2010/main" val="0"/>
+              </a:ext>
+            </a:extLst>
+          </a:blip>
+          <a:stretch>
+            <a:fillRect/>
+          </a:stretch>
+        </p:blipFill>
+        <p:spPr>
+          <a:xfrm>
+            <a:off x="0" y="0"/>
+            <a:ext cx="12192000" cy="6858000"/>
+          </a:xfrm>
+          <a:prstGeom prst="rect">
+            <a:avLst/>
+          </a:prstGeom>
+        </p:spPr>
+      </p:pic>
+    </p:spTree>
+    <p:extLst>
+      <p:ext uri="{BB962C8B-B14F-4D97-AF65-F5344CB8AC3E}">
+        <p14:creationId xmlns:p14="http://schemas.microsoft.com/office/powerpoint/2010/main" val="40367406"/>
+      </p:ext>
+    </p:extLst>
+  </p:cSld>
+  <p:clrMapOvr>
+    <a:masterClrMapping/>
+  </p:clrMapOvr>
+</p:sld>
+</file>
+
+<file path=ppt/slides/slide6.xml><?xml version="1.0" encoding="utf-8"?>
+<p:sld xmlns:a="http://schemas.openxmlformats.org/drawingml/2006/main" xmlns:r="http://schemas.openxmlformats.org/officeDocument/2006/relationships" xmlns:p="http://schemas.openxmlformats.org/presentationml/2006/main">
+  <p:cSld>
+    <p:spTree>
+      <p:nvGrpSpPr>
+        <p:cNvPr id="1" name=""/>
+        <p:cNvGrpSpPr/>
+        <p:nvPr/>
+      </p:nvGrpSpPr>
+      <p:grpSpPr>
+        <a:xfrm>
+          <a:off x="0" y="0"/>
+          <a:ext cx="0" cy="0"/>
+          <a:chOff x="0" y="0"/>
+          <a:chExt cx="0" cy="0"/>
+        </a:xfrm>
+      </p:grpSpPr>
+      <p:sp>
+        <p:nvSpPr>
+          <p:cNvPr id="2" name="Título 1">
+            <a:extLst>
+              <a:ext uri="{FF2B5EF4-FFF2-40B4-BE49-F238E27FC236}">
+                <a16:creationId xmlns:a16="http://schemas.microsoft.com/office/drawing/2014/main" id="{77359F12-3BAD-404F-91B0-F5331DC3BBD2}"/>
+              </a:ext>
+            </a:extLst>
+          </p:cNvPr>
+          <p:cNvSpPr>
+            <a:spLocks noGrp="1"/>
+          </p:cNvSpPr>
+          <p:nvPr>
+            <p:ph type="title"/>
+          </p:nvPr>
+        </p:nvSpPr>
+        <p:spPr>
+          <a:xfrm>
+            <a:off x="838200" y="365125"/>
+            <a:ext cx="10515600" cy="986597"/>
+          </a:xfrm>
+        </p:spPr>
+        <p:txBody>
+          <a:bodyPr>
+            <a:normAutofit fontScale="90000"/>
+          </a:bodyPr>
+          <a:lstStyle/>
+          <a:p>
+            <a:r>
+              <a:rPr lang="pt-BR" sz="3700" b="1" dirty="0" err="1">
+                <a:solidFill>
+                  <a:srgbClr val="00B0F0"/>
+                </a:solidFill>
+                <a:latin typeface="Exo 2" panose="00000500000000000000" pitchFamily="50" charset="0"/>
+              </a:rPr>
+              <a:t>User</a:t>
+            </a:r>
+            <a:r>
+              <a:rPr lang="pt-BR" sz="3700" b="1" dirty="0">
+                <a:solidFill>
+                  <a:srgbClr val="00B0F0"/>
+                </a:solidFill>
+                <a:latin typeface="Exo 2" panose="00000500000000000000" pitchFamily="50" charset="0"/>
+              </a:rPr>
+              <a:t> Stories 1</a:t>
+            </a:r>
+            <a:br>
+              <a:rPr lang="pt-BR" dirty="0"/>
+            </a:br>
+            <a:endParaRPr lang="pt-BR" dirty="0"/>
+          </a:p>
+        </p:txBody>
+      </p:sp>
+      <p:sp>
+        <p:nvSpPr>
+          <p:cNvPr id="3" name="Espaço Reservado para Conteúdo 2">
+            <a:extLst>
+              <a:ext uri="{FF2B5EF4-FFF2-40B4-BE49-F238E27FC236}">
+                <a16:creationId xmlns:a16="http://schemas.microsoft.com/office/drawing/2014/main" id="{DDD43297-2D2C-41A1-81AC-C6A525CCE3CB}"/>
+              </a:ext>
+            </a:extLst>
+          </p:cNvPr>
+          <p:cNvSpPr>
+            <a:spLocks noGrp="1"/>
+          </p:cNvSpPr>
+          <p:nvPr>
+            <p:ph idx="1"/>
+          </p:nvPr>
+        </p:nvSpPr>
+        <p:spPr>
+          <a:xfrm>
+            <a:off x="838200" y="1229278"/>
+            <a:ext cx="10515600" cy="1911487"/>
+          </a:xfrm>
+        </p:spPr>
+        <p:txBody>
+          <a:bodyPr>
+            <a:normAutofit/>
+          </a:bodyPr>
+          <a:lstStyle/>
+          <a:p>
+            <a:endParaRPr lang="pt-BR" dirty="0"/>
+          </a:p>
+          <a:p>
+            <a:pPr marL="0" indent="0" algn="ctr">
+              <a:buNone/>
+            </a:pPr>
+            <a:r>
+              <a:rPr lang="pt-BR" sz="3000" dirty="0">
+                <a:latin typeface="Exo 2" panose="00000500000000000000" pitchFamily="50" charset="0"/>
+              </a:rPr>
+              <a:t>Enquanto </a:t>
+            </a:r>
+            <a:r>
+              <a:rPr lang="pt-BR" sz="3000" dirty="0">
+                <a:solidFill>
+                  <a:srgbClr val="FF0066"/>
+                </a:solidFill>
+                <a:latin typeface="Exo 2" panose="00000500000000000000" pitchFamily="50" charset="0"/>
+              </a:rPr>
+              <a:t>gerente de infraestrutura</a:t>
+            </a:r>
+            <a:r>
+              <a:rPr lang="pt-BR" sz="3000" dirty="0">
+                <a:latin typeface="Exo 2" panose="00000500000000000000" pitchFamily="50" charset="0"/>
+              </a:rPr>
+              <a:t> do prédio, preciso me assegurar acerca da segurança dos funcionários e das informações </a:t>
+            </a:r>
+          </a:p>
+          <a:p>
+            <a:endParaRPr lang="pt-BR" dirty="0"/>
+          </a:p>
+        </p:txBody>
+      </p:sp>
+      <p:sp>
+        <p:nvSpPr>
+          <p:cNvPr id="4" name="Título 1">
+            <a:extLst>
+              <a:ext uri="{FF2B5EF4-FFF2-40B4-BE49-F238E27FC236}">
+                <a16:creationId xmlns:a16="http://schemas.microsoft.com/office/drawing/2014/main" id="{36EE56E1-007A-45A7-82AA-52FA178D141B}"/>
+              </a:ext>
+            </a:extLst>
+          </p:cNvPr>
+          <p:cNvSpPr txBox="1">
+            <a:spLocks/>
+          </p:cNvSpPr>
+          <p:nvPr/>
+        </p:nvSpPr>
+        <p:spPr>
+          <a:xfrm>
+            <a:off x="838200" y="3429000"/>
+            <a:ext cx="10515600" cy="986597"/>
+          </a:xfrm>
+          <a:prstGeom prst="rect">
+            <a:avLst/>
+          </a:prstGeom>
+        </p:spPr>
+        <p:txBody>
+          <a:bodyPr vert="horz" lIns="91440" tIns="45720" rIns="91440" bIns="45720" rtlCol="0" anchor="ctr">
+            <a:normAutofit fontScale="92500" lnSpcReduction="20000"/>
+          </a:bodyPr>
+          <a:lstStyle>
+            <a:lvl1pPr algn="l" defTabSz="914400" rtl="0" eaLnBrk="1" latinLnBrk="0" hangingPunct="1">
+              <a:lnSpc>
+                <a:spcPct val="90000"/>
+              </a:lnSpc>
+              <a:spcBef>
+                <a:spcPct val="0"/>
+              </a:spcBef>
+              <a:buNone/>
+              <a:defRPr sz="4400" kern="1200">
+                <a:solidFill>
+                  <a:schemeClr val="tx1"/>
+                </a:solidFill>
+                <a:latin typeface="+mj-lt"/>
+                <a:ea typeface="+mj-ea"/>
+                <a:cs typeface="+mj-cs"/>
+              </a:defRPr>
+            </a:lvl1pPr>
+          </a:lstStyle>
+          <a:p>
+            <a:r>
+              <a:rPr lang="pt-BR" sz="3600" b="1" dirty="0" err="1">
+                <a:solidFill>
+                  <a:srgbClr val="00B0F0"/>
+                </a:solidFill>
+                <a:latin typeface="Exo 2" panose="00000500000000000000" pitchFamily="50" charset="0"/>
+              </a:rPr>
+              <a:t>User</a:t>
+            </a:r>
+            <a:r>
+              <a:rPr lang="pt-BR" sz="3600" b="1" dirty="0">
+                <a:solidFill>
+                  <a:srgbClr val="00B0F0"/>
+                </a:solidFill>
+                <a:latin typeface="Exo 2" panose="00000500000000000000" pitchFamily="50" charset="0"/>
+              </a:rPr>
+              <a:t> Stories 2</a:t>
+            </a:r>
+            <a:br>
+              <a:rPr lang="pt-BR" dirty="0"/>
+            </a:br>
+            <a:endParaRPr lang="pt-BR" dirty="0"/>
+          </a:p>
+        </p:txBody>
+      </p:sp>
+      <p:sp>
+        <p:nvSpPr>
+          <p:cNvPr id="5" name="Espaço Reservado para Conteúdo 2">
+            <a:extLst>
+              <a:ext uri="{FF2B5EF4-FFF2-40B4-BE49-F238E27FC236}">
+                <a16:creationId xmlns:a16="http://schemas.microsoft.com/office/drawing/2014/main" id="{052B6FE0-7A8F-42A3-AEBA-8CCB7DD84248}"/>
+              </a:ext>
+            </a:extLst>
+          </p:cNvPr>
+          <p:cNvSpPr txBox="1">
+            <a:spLocks/>
+          </p:cNvSpPr>
+          <p:nvPr/>
+        </p:nvSpPr>
+        <p:spPr>
+          <a:xfrm>
+            <a:off x="838200" y="3882886"/>
+            <a:ext cx="10515600" cy="2491409"/>
+          </a:xfrm>
+          <a:prstGeom prst="rect">
+            <a:avLst/>
+          </a:prstGeom>
+        </p:spPr>
+        <p:txBody>
+          <a:bodyPr vert="horz" lIns="91440" tIns="45720" rIns="91440" bIns="45720" rtlCol="0">
+            <a:normAutofit fontScale="92500" lnSpcReduction="20000"/>
+          </a:bodyPr>
+          <a:lstStyle>
+            <a:lvl1pPr marL="228600" indent="-228600" algn="l" defTabSz="914400" rtl="0" eaLnBrk="1" latinLnBrk="0" hangingPunct="1">
+              <a:lnSpc>
+                <a:spcPct val="90000"/>
+              </a:lnSpc>
+              <a:spcBef>
+                <a:spcPts val="1000"/>
+              </a:spcBef>
+              <a:buFont typeface="Arial" panose="020B0604020202020204" pitchFamily="34" charset="0"/>
+              <a:buChar char="•"/>
+              <a:defRPr sz="2800" kern="1200">
+                <a:solidFill>
+                  <a:schemeClr val="tx1"/>
+                </a:solidFill>
+                <a:latin typeface="+mn-lt"/>
+                <a:ea typeface="+mn-ea"/>
+                <a:cs typeface="+mn-cs"/>
+              </a:defRPr>
+            </a:lvl1pPr>
+            <a:lvl2pPr marL="685800" indent="-228600" algn="l" defTabSz="914400" rtl="0" eaLnBrk="1" latinLnBrk="0" hangingPunct="1">
+              <a:lnSpc>
+                <a:spcPct val="90000"/>
+              </a:lnSpc>
+              <a:spcBef>
+                <a:spcPts val="500"/>
+              </a:spcBef>
+              <a:buFont typeface="Arial" panose="020B0604020202020204" pitchFamily="34" charset="0"/>
+              <a:buChar char="•"/>
+              <a:defRPr sz="2400" kern="1200">
+                <a:solidFill>
+                  <a:schemeClr val="tx1"/>
+                </a:solidFill>
+                <a:latin typeface="+mn-lt"/>
+                <a:ea typeface="+mn-ea"/>
+                <a:cs typeface="+mn-cs"/>
+              </a:defRPr>
+            </a:lvl2pPr>
+            <a:lvl3pPr marL="1143000" indent="-228600" algn="l" defTabSz="914400" rtl="0" eaLnBrk="1" latinLnBrk="0" hangingPunct="1">
+              <a:lnSpc>
+                <a:spcPct val="90000"/>
+              </a:lnSpc>
+              <a:spcBef>
+                <a:spcPts val="500"/>
+              </a:spcBef>
+              <a:buFont typeface="Arial" panose="020B0604020202020204" pitchFamily="34" charset="0"/>
+              <a:buChar char="•"/>
+              <a:defRPr sz="2000" kern="1200">
+                <a:solidFill>
+                  <a:schemeClr val="tx1"/>
+                </a:solidFill>
+                <a:latin typeface="+mn-lt"/>
+                <a:ea typeface="+mn-ea"/>
+                <a:cs typeface="+mn-cs"/>
+              </a:defRPr>
+            </a:lvl3pPr>
+            <a:lvl4pPr marL="1600200" indent="-228600" algn="l" defTabSz="914400" rtl="0" eaLnBrk="1" latinLnBrk="0" hangingPunct="1">
+              <a:lnSpc>
+                <a:spcPct val="90000"/>
+              </a:lnSpc>
+              <a:spcBef>
+                <a:spcPts val="500"/>
+              </a:spcBef>
+              <a:buFont typeface="Arial" panose="020B0604020202020204" pitchFamily="34" charset="0"/>
+              <a:buChar char="•"/>
+              <a:defRPr sz="1800" kern="1200">
+                <a:solidFill>
+                  <a:schemeClr val="tx1"/>
+                </a:solidFill>
+                <a:latin typeface="+mn-lt"/>
+                <a:ea typeface="+mn-ea"/>
+                <a:cs typeface="+mn-cs"/>
+              </a:defRPr>
+            </a:lvl4pPr>
+            <a:lvl5pPr marL="2057400" indent="-228600" algn="l" defTabSz="914400" rtl="0" eaLnBrk="1" latinLnBrk="0" hangingPunct="1">
+              <a:lnSpc>
+                <a:spcPct val="90000"/>
+              </a:lnSpc>
+              <a:spcBef>
+                <a:spcPts val="500"/>
+              </a:spcBef>
+              <a:buFont typeface="Arial" panose="020B0604020202020204" pitchFamily="34" charset="0"/>
+              <a:buChar char="•"/>
+              <a:defRPr sz="1800" kern="1200">
+                <a:solidFill>
+                  <a:schemeClr val="tx1"/>
+                </a:solidFill>
+                <a:latin typeface="+mn-lt"/>
+                <a:ea typeface="+mn-ea"/>
+                <a:cs typeface="+mn-cs"/>
+              </a:defRPr>
+            </a:lvl5pPr>
+            <a:lvl6pPr marL="2514600" indent="-228600" algn="l" defTabSz="914400" rtl="0" eaLnBrk="1" latinLnBrk="0" hangingPunct="1">
+              <a:lnSpc>
+                <a:spcPct val="90000"/>
+              </a:lnSpc>
+              <a:spcBef>
+                <a:spcPts val="500"/>
+              </a:spcBef>
+              <a:buFont typeface="Arial" panose="020B0604020202020204" pitchFamily="34" charset="0"/>
+              <a:buChar char="•"/>
+              <a:defRPr sz="1800" kern="1200">
+                <a:solidFill>
+                  <a:schemeClr val="tx1"/>
+                </a:solidFill>
+                <a:latin typeface="+mn-lt"/>
+                <a:ea typeface="+mn-ea"/>
+                <a:cs typeface="+mn-cs"/>
+              </a:defRPr>
+            </a:lvl6pPr>
+            <a:lvl7pPr marL="2971800" indent="-228600" algn="l" defTabSz="914400" rtl="0" eaLnBrk="1" latinLnBrk="0" hangingPunct="1">
+              <a:lnSpc>
+                <a:spcPct val="90000"/>
+              </a:lnSpc>
+              <a:spcBef>
+                <a:spcPts val="500"/>
+              </a:spcBef>
+              <a:buFont typeface="Arial" panose="020B0604020202020204" pitchFamily="34" charset="0"/>
+              <a:buChar char="•"/>
+              <a:defRPr sz="1800" kern="1200">
+                <a:solidFill>
+                  <a:schemeClr val="tx1"/>
+                </a:solidFill>
+                <a:latin typeface="+mn-lt"/>
+                <a:ea typeface="+mn-ea"/>
+                <a:cs typeface="+mn-cs"/>
+              </a:defRPr>
+            </a:lvl7pPr>
+            <a:lvl8pPr marL="3429000" indent="-228600" algn="l" defTabSz="914400" rtl="0" eaLnBrk="1" latinLnBrk="0" hangingPunct="1">
+              <a:lnSpc>
+                <a:spcPct val="90000"/>
+              </a:lnSpc>
+              <a:spcBef>
+                <a:spcPts val="500"/>
+              </a:spcBef>
+              <a:buFont typeface="Arial" panose="020B0604020202020204" pitchFamily="34" charset="0"/>
+              <a:buChar char="•"/>
+              <a:defRPr sz="1800" kern="1200">
+                <a:solidFill>
+                  <a:schemeClr val="tx1"/>
+                </a:solidFill>
+                <a:latin typeface="+mn-lt"/>
+                <a:ea typeface="+mn-ea"/>
+                <a:cs typeface="+mn-cs"/>
+              </a:defRPr>
+            </a:lvl8pPr>
+            <a:lvl9pPr marL="3886200" indent="-228600" algn="l" defTabSz="914400" rtl="0" eaLnBrk="1" latinLnBrk="0" hangingPunct="1">
+              <a:lnSpc>
+                <a:spcPct val="90000"/>
+              </a:lnSpc>
+              <a:spcBef>
+                <a:spcPts val="500"/>
+              </a:spcBef>
+              <a:buFont typeface="Arial" panose="020B0604020202020204" pitchFamily="34" charset="0"/>
+              <a:buChar char="•"/>
+              <a:defRPr sz="1800" kern="1200">
+                <a:solidFill>
+                  <a:schemeClr val="tx1"/>
+                </a:solidFill>
+                <a:latin typeface="+mn-lt"/>
+                <a:ea typeface="+mn-ea"/>
+                <a:cs typeface="+mn-cs"/>
+              </a:defRPr>
+            </a:lvl9pPr>
+          </a:lstStyle>
+          <a:p>
+            <a:endParaRPr lang="pt-BR" dirty="0"/>
+          </a:p>
+          <a:p>
+            <a:endParaRPr lang="pt-BR" sz="3200" dirty="0"/>
+          </a:p>
+          <a:p>
+            <a:pPr marL="0" indent="0" algn="ctr">
+              <a:buFont typeface="Arial" panose="020B0604020202020204" pitchFamily="34" charset="0"/>
+              <a:buNone/>
+            </a:pPr>
+            <a:r>
+              <a:rPr lang="pt-BR" sz="3500" dirty="0">
+                <a:latin typeface="Exo 2" panose="00000500000000000000" pitchFamily="50" charset="0"/>
+              </a:rPr>
+              <a:t>Eu, enquanto </a:t>
+            </a:r>
+            <a:r>
+              <a:rPr lang="pt-BR" sz="3500" dirty="0">
+                <a:solidFill>
+                  <a:srgbClr val="FF0066"/>
+                </a:solidFill>
+                <a:latin typeface="Exo 2" panose="00000500000000000000" pitchFamily="50" charset="0"/>
+              </a:rPr>
+              <a:t>dono de uma empresa de TI</a:t>
+            </a:r>
+            <a:r>
+              <a:rPr lang="pt-BR" sz="3500" dirty="0">
+                <a:latin typeface="Exo 2" panose="00000500000000000000" pitchFamily="50" charset="0"/>
+              </a:rPr>
+              <a:t>, preciso assegurar a continuidade das operações da minha empresa e o sigilo de dados porque tenho obrigações legais, fiscais e segredos de negócio. </a:t>
+            </a:r>
+          </a:p>
+          <a:p>
+            <a:endParaRPr lang="pt-BR" dirty="0"/>
+          </a:p>
+        </p:txBody>
+      </p:sp>
+    </p:spTree>
+    <p:extLst>
+      <p:ext uri="{BB962C8B-B14F-4D97-AF65-F5344CB8AC3E}">
+        <p14:creationId xmlns:p14="http://schemas.microsoft.com/office/powerpoint/2010/main" val="3147821839"/>
+      </p:ext>
+    </p:extLst>
+  </p:cSld>
+  <p:clrMapOvr>
+    <a:masterClrMapping/>
+  </p:clrMapOvr>
+</p:sld>
+</file>
+
+<file path=ppt/slides/slide7.xml><?xml version="1.0" encoding="utf-8"?>
+<p:sld xmlns:a="http://schemas.openxmlformats.org/drawingml/2006/main" xmlns:r="http://schemas.openxmlformats.org/officeDocument/2006/relationships" xmlns:p="http://schemas.openxmlformats.org/presentationml/2006/main">
+  <p:cSld>
+    <p:spTree>
+      <p:nvGrpSpPr>
+        <p:cNvPr id="1" name=""/>
+        <p:cNvGrpSpPr/>
+        <p:nvPr/>
+      </p:nvGrpSpPr>
+      <p:grpSpPr>
+        <a:xfrm>
+          <a:off x="0" y="0"/>
+          <a:ext cx="0" cy="0"/>
+          <a:chOff x="0" y="0"/>
+          <a:chExt cx="0" cy="0"/>
+        </a:xfrm>
+      </p:grpSpPr>
+      <p:sp>
+        <p:nvSpPr>
+          <p:cNvPr id="2" name="Título 1">
+            <a:extLst>
+              <a:ext uri="{FF2B5EF4-FFF2-40B4-BE49-F238E27FC236}">
+                <a16:creationId xmlns:a16="http://schemas.microsoft.com/office/drawing/2014/main" id="{77359F12-3BAD-404F-91B0-F5331DC3BBD2}"/>
+              </a:ext>
+            </a:extLst>
+          </p:cNvPr>
+          <p:cNvSpPr>
+            <a:spLocks noGrp="1"/>
+          </p:cNvSpPr>
+          <p:nvPr>
+            <p:ph type="title"/>
+          </p:nvPr>
+        </p:nvSpPr>
+        <p:spPr/>
+        <p:txBody>
+          <a:bodyPr/>
+          <a:lstStyle/>
+          <a:p>
+            <a:r>
+              <a:rPr lang="pt-BR" sz="3300" b="1" dirty="0" err="1">
+                <a:solidFill>
+                  <a:srgbClr val="00B0F0"/>
+                </a:solidFill>
+                <a:latin typeface="Exo 2" panose="00000500000000000000" pitchFamily="50" charset="0"/>
+              </a:rPr>
+              <a:t>User</a:t>
+            </a:r>
+            <a:r>
+              <a:rPr lang="pt-BR" sz="3300" b="1" dirty="0">
+                <a:solidFill>
+                  <a:srgbClr val="00B0F0"/>
+                </a:solidFill>
+                <a:latin typeface="Exo 2" panose="00000500000000000000" pitchFamily="50" charset="0"/>
+              </a:rPr>
+              <a:t> Stories 3</a:t>
+            </a:r>
+            <a:br>
+              <a:rPr lang="pt-BR" dirty="0"/>
+            </a:br>
+            <a:endParaRPr lang="pt-BR" dirty="0"/>
+          </a:p>
+        </p:txBody>
+      </p:sp>
+      <p:sp>
+        <p:nvSpPr>
+          <p:cNvPr id="3" name="Espaço Reservado para Conteúdo 2">
+            <a:extLst>
+              <a:ext uri="{FF2B5EF4-FFF2-40B4-BE49-F238E27FC236}">
+                <a16:creationId xmlns:a16="http://schemas.microsoft.com/office/drawing/2014/main" id="{DDD43297-2D2C-41A1-81AC-C6A525CCE3CB}"/>
+              </a:ext>
+            </a:extLst>
+          </p:cNvPr>
+          <p:cNvSpPr>
+            <a:spLocks noGrp="1"/>
+          </p:cNvSpPr>
+          <p:nvPr>
+            <p:ph idx="1"/>
+          </p:nvPr>
+        </p:nvSpPr>
+        <p:spPr>
+          <a:xfrm>
+            <a:off x="838200" y="993912"/>
+            <a:ext cx="10515600" cy="2080592"/>
+          </a:xfrm>
+        </p:spPr>
+        <p:txBody>
+          <a:bodyPr>
+            <a:normAutofit fontScale="70000" lnSpcReduction="20000"/>
+          </a:bodyPr>
+          <a:lstStyle/>
+          <a:p>
+            <a:endParaRPr lang="pt-BR" dirty="0"/>
+          </a:p>
+          <a:p>
+            <a:endParaRPr lang="pt-BR" sz="3200" dirty="0"/>
+          </a:p>
+          <a:p>
+            <a:pPr marL="0" indent="0" algn="ctr">
+              <a:buNone/>
+            </a:pPr>
+            <a:r>
+              <a:rPr lang="pt-BR" sz="4300" dirty="0">
+                <a:latin typeface="Exo 2" panose="00000500000000000000" pitchFamily="50" charset="0"/>
+              </a:rPr>
+              <a:t>Eu, enquanto funcionário</a:t>
+            </a:r>
+            <a:r>
+              <a:rPr lang="pt-BR" sz="4300" dirty="0">
+                <a:solidFill>
+                  <a:srgbClr val="FF0066"/>
+                </a:solidFill>
+                <a:latin typeface="Exo 2" panose="00000500000000000000" pitchFamily="50" charset="0"/>
+              </a:rPr>
+              <a:t> analista de dados </a:t>
+            </a:r>
+            <a:r>
+              <a:rPr lang="pt-BR" sz="4300" dirty="0">
+                <a:latin typeface="Exo 2" panose="00000500000000000000" pitchFamily="50" charset="0"/>
+              </a:rPr>
+              <a:t>, preciso de um sistema versátil e fácil de utilizar para economizar tempo ao fazer as buscas e visualizar as informações de forma mais rápida</a:t>
+            </a:r>
+          </a:p>
+        </p:txBody>
+      </p:sp>
+      <p:sp>
+        <p:nvSpPr>
+          <p:cNvPr id="4" name="Título 1">
+            <a:extLst>
+              <a:ext uri="{FF2B5EF4-FFF2-40B4-BE49-F238E27FC236}">
+                <a16:creationId xmlns:a16="http://schemas.microsoft.com/office/drawing/2014/main" id="{90F18D31-A005-498C-90D4-46C7EAD34FF8}"/>
+              </a:ext>
+            </a:extLst>
+          </p:cNvPr>
+          <p:cNvSpPr txBox="1">
+            <a:spLocks/>
+          </p:cNvSpPr>
+          <p:nvPr/>
+        </p:nvSpPr>
+        <p:spPr>
+          <a:xfrm>
+            <a:off x="838200" y="3196362"/>
+            <a:ext cx="10515600" cy="1325563"/>
+          </a:xfrm>
+          <a:prstGeom prst="rect">
+            <a:avLst/>
+          </a:prstGeom>
+        </p:spPr>
+        <p:txBody>
+          <a:bodyPr vert="horz" lIns="91440" tIns="45720" rIns="91440" bIns="45720" rtlCol="0" anchor="ctr">
+            <a:normAutofit/>
+          </a:bodyPr>
+          <a:lstStyle>
+            <a:lvl1pPr algn="l" defTabSz="914400" rtl="0" eaLnBrk="1" latinLnBrk="0" hangingPunct="1">
+              <a:lnSpc>
+                <a:spcPct val="90000"/>
+              </a:lnSpc>
+              <a:spcBef>
+                <a:spcPct val="0"/>
+              </a:spcBef>
+              <a:buNone/>
+              <a:defRPr sz="4400" kern="1200">
+                <a:solidFill>
+                  <a:schemeClr val="tx1"/>
+                </a:solidFill>
+                <a:latin typeface="+mj-lt"/>
+                <a:ea typeface="+mj-ea"/>
+                <a:cs typeface="+mj-cs"/>
+              </a:defRPr>
+            </a:lvl1pPr>
+          </a:lstStyle>
+          <a:p>
+            <a:r>
+              <a:rPr lang="pt-BR" sz="3300" b="1" dirty="0" err="1">
+                <a:solidFill>
+                  <a:srgbClr val="00B0F0"/>
+                </a:solidFill>
+                <a:latin typeface="Exo 2" panose="00000500000000000000" pitchFamily="50" charset="0"/>
+              </a:rPr>
+              <a:t>User</a:t>
+            </a:r>
+            <a:r>
+              <a:rPr lang="pt-BR" sz="3300" b="1" dirty="0">
+                <a:solidFill>
+                  <a:srgbClr val="00B0F0"/>
+                </a:solidFill>
+                <a:latin typeface="Exo 2" panose="00000500000000000000" pitchFamily="50" charset="0"/>
+              </a:rPr>
+              <a:t> Stories 4</a:t>
+            </a:r>
+            <a:br>
+              <a:rPr lang="pt-BR" dirty="0"/>
+            </a:br>
+            <a:endParaRPr lang="pt-BR" dirty="0"/>
+          </a:p>
+        </p:txBody>
+      </p:sp>
+      <p:sp>
+        <p:nvSpPr>
+          <p:cNvPr id="5" name="Espaço Reservado para Conteúdo 2">
+            <a:extLst>
+              <a:ext uri="{FF2B5EF4-FFF2-40B4-BE49-F238E27FC236}">
+                <a16:creationId xmlns:a16="http://schemas.microsoft.com/office/drawing/2014/main" id="{F4AE2166-70CB-4B72-8389-25B766E5B541}"/>
+              </a:ext>
+            </a:extLst>
+          </p:cNvPr>
+          <p:cNvSpPr txBox="1">
+            <a:spLocks/>
+          </p:cNvSpPr>
+          <p:nvPr/>
+        </p:nvSpPr>
+        <p:spPr>
+          <a:xfrm>
+            <a:off x="838200" y="3803374"/>
+            <a:ext cx="10515600" cy="2464904"/>
+          </a:xfrm>
+          <a:prstGeom prst="rect">
+            <a:avLst/>
+          </a:prstGeom>
+        </p:spPr>
+        <p:txBody>
+          <a:bodyPr vert="horz" lIns="91440" tIns="45720" rIns="91440" bIns="45720" rtlCol="0">
+            <a:normAutofit fontScale="92500" lnSpcReduction="20000"/>
+          </a:bodyPr>
+          <a:lstStyle>
+            <a:lvl1pPr marL="228600" indent="-228600" algn="l" defTabSz="914400" rtl="0" eaLnBrk="1" latinLnBrk="0" hangingPunct="1">
+              <a:lnSpc>
+                <a:spcPct val="90000"/>
+              </a:lnSpc>
+              <a:spcBef>
+                <a:spcPts val="1000"/>
+              </a:spcBef>
+              <a:buFont typeface="Arial" panose="020B0604020202020204" pitchFamily="34" charset="0"/>
+              <a:buChar char="•"/>
+              <a:defRPr sz="2800" kern="1200">
+                <a:solidFill>
+                  <a:schemeClr val="tx1"/>
+                </a:solidFill>
+                <a:latin typeface="+mn-lt"/>
+                <a:ea typeface="+mn-ea"/>
+                <a:cs typeface="+mn-cs"/>
+              </a:defRPr>
+            </a:lvl1pPr>
+            <a:lvl2pPr marL="685800" indent="-228600" algn="l" defTabSz="914400" rtl="0" eaLnBrk="1" latinLnBrk="0" hangingPunct="1">
+              <a:lnSpc>
+                <a:spcPct val="90000"/>
+              </a:lnSpc>
+              <a:spcBef>
+                <a:spcPts val="500"/>
+              </a:spcBef>
+              <a:buFont typeface="Arial" panose="020B0604020202020204" pitchFamily="34" charset="0"/>
+              <a:buChar char="•"/>
+              <a:defRPr sz="2400" kern="1200">
+                <a:solidFill>
+                  <a:schemeClr val="tx1"/>
+                </a:solidFill>
+                <a:latin typeface="+mn-lt"/>
+                <a:ea typeface="+mn-ea"/>
+                <a:cs typeface="+mn-cs"/>
+              </a:defRPr>
+            </a:lvl2pPr>
+            <a:lvl3pPr marL="1143000" indent="-228600" algn="l" defTabSz="914400" rtl="0" eaLnBrk="1" latinLnBrk="0" hangingPunct="1">
+              <a:lnSpc>
+                <a:spcPct val="90000"/>
+              </a:lnSpc>
+              <a:spcBef>
+                <a:spcPts val="500"/>
+              </a:spcBef>
+              <a:buFont typeface="Arial" panose="020B0604020202020204" pitchFamily="34" charset="0"/>
+              <a:buChar char="•"/>
+              <a:defRPr sz="2000" kern="1200">
+                <a:solidFill>
+                  <a:schemeClr val="tx1"/>
+                </a:solidFill>
+                <a:latin typeface="+mn-lt"/>
+                <a:ea typeface="+mn-ea"/>
+                <a:cs typeface="+mn-cs"/>
+              </a:defRPr>
+            </a:lvl3pPr>
+            <a:lvl4pPr marL="1600200" indent="-228600" algn="l" defTabSz="914400" rtl="0" eaLnBrk="1" latinLnBrk="0" hangingPunct="1">
+              <a:lnSpc>
+                <a:spcPct val="90000"/>
+              </a:lnSpc>
+              <a:spcBef>
+                <a:spcPts val="500"/>
+              </a:spcBef>
+              <a:buFont typeface="Arial" panose="020B0604020202020204" pitchFamily="34" charset="0"/>
+              <a:buChar char="•"/>
+              <a:defRPr sz="1800" kern="1200">
+                <a:solidFill>
+                  <a:schemeClr val="tx1"/>
+                </a:solidFill>
+                <a:latin typeface="+mn-lt"/>
+                <a:ea typeface="+mn-ea"/>
+                <a:cs typeface="+mn-cs"/>
+              </a:defRPr>
+            </a:lvl4pPr>
+            <a:lvl5pPr marL="2057400" indent="-228600" algn="l" defTabSz="914400" rtl="0" eaLnBrk="1" latinLnBrk="0" hangingPunct="1">
+              <a:lnSpc>
+                <a:spcPct val="90000"/>
+              </a:lnSpc>
+              <a:spcBef>
+                <a:spcPts val="500"/>
+              </a:spcBef>
+              <a:buFont typeface="Arial" panose="020B0604020202020204" pitchFamily="34" charset="0"/>
+              <a:buChar char="•"/>
+              <a:defRPr sz="1800" kern="1200">
+                <a:solidFill>
+                  <a:schemeClr val="tx1"/>
+                </a:solidFill>
+                <a:latin typeface="+mn-lt"/>
+                <a:ea typeface="+mn-ea"/>
+                <a:cs typeface="+mn-cs"/>
+              </a:defRPr>
+            </a:lvl5pPr>
+            <a:lvl6pPr marL="2514600" indent="-228600" algn="l" defTabSz="914400" rtl="0" eaLnBrk="1" latinLnBrk="0" hangingPunct="1">
+              <a:lnSpc>
+                <a:spcPct val="90000"/>
+              </a:lnSpc>
+              <a:spcBef>
+                <a:spcPts val="500"/>
+              </a:spcBef>
+              <a:buFont typeface="Arial" panose="020B0604020202020204" pitchFamily="34" charset="0"/>
+              <a:buChar char="•"/>
+              <a:defRPr sz="1800" kern="1200">
+                <a:solidFill>
+                  <a:schemeClr val="tx1"/>
+                </a:solidFill>
+                <a:latin typeface="+mn-lt"/>
+                <a:ea typeface="+mn-ea"/>
+                <a:cs typeface="+mn-cs"/>
+              </a:defRPr>
+            </a:lvl6pPr>
+            <a:lvl7pPr marL="2971800" indent="-228600" algn="l" defTabSz="914400" rtl="0" eaLnBrk="1" latinLnBrk="0" hangingPunct="1">
+              <a:lnSpc>
+                <a:spcPct val="90000"/>
+              </a:lnSpc>
+              <a:spcBef>
+                <a:spcPts val="500"/>
+              </a:spcBef>
+              <a:buFont typeface="Arial" panose="020B0604020202020204" pitchFamily="34" charset="0"/>
+              <a:buChar char="•"/>
+              <a:defRPr sz="1800" kern="1200">
+                <a:solidFill>
+                  <a:schemeClr val="tx1"/>
+                </a:solidFill>
+                <a:latin typeface="+mn-lt"/>
+                <a:ea typeface="+mn-ea"/>
+                <a:cs typeface="+mn-cs"/>
+              </a:defRPr>
+            </a:lvl7pPr>
+            <a:lvl8pPr marL="3429000" indent="-228600" algn="l" defTabSz="914400" rtl="0" eaLnBrk="1" latinLnBrk="0" hangingPunct="1">
+              <a:lnSpc>
+                <a:spcPct val="90000"/>
+              </a:lnSpc>
+              <a:spcBef>
+                <a:spcPts val="500"/>
+              </a:spcBef>
+              <a:buFont typeface="Arial" panose="020B0604020202020204" pitchFamily="34" charset="0"/>
+              <a:buChar char="•"/>
+              <a:defRPr sz="1800" kern="1200">
+                <a:solidFill>
+                  <a:schemeClr val="tx1"/>
+                </a:solidFill>
+                <a:latin typeface="+mn-lt"/>
+                <a:ea typeface="+mn-ea"/>
+                <a:cs typeface="+mn-cs"/>
+              </a:defRPr>
+            </a:lvl8pPr>
+            <a:lvl9pPr marL="3886200" indent="-228600" algn="l" defTabSz="914400" rtl="0" eaLnBrk="1" latinLnBrk="0" hangingPunct="1">
+              <a:lnSpc>
+                <a:spcPct val="90000"/>
+              </a:lnSpc>
+              <a:spcBef>
+                <a:spcPts val="500"/>
+              </a:spcBef>
+              <a:buFont typeface="Arial" panose="020B0604020202020204" pitchFamily="34" charset="0"/>
+              <a:buChar char="•"/>
+              <a:defRPr sz="1800" kern="1200">
+                <a:solidFill>
+                  <a:schemeClr val="tx1"/>
+                </a:solidFill>
+                <a:latin typeface="+mn-lt"/>
+                <a:ea typeface="+mn-ea"/>
+                <a:cs typeface="+mn-cs"/>
+              </a:defRPr>
+            </a:lvl9pPr>
+          </a:lstStyle>
+          <a:p>
+            <a:endParaRPr lang="pt-BR" dirty="0"/>
+          </a:p>
+          <a:p>
+            <a:endParaRPr lang="pt-BR" sz="3200" dirty="0"/>
+          </a:p>
+          <a:p>
+            <a:pPr marL="0" indent="0" algn="ctr">
+              <a:buFont typeface="Arial" panose="020B0604020202020204" pitchFamily="34" charset="0"/>
+              <a:buNone/>
+            </a:pPr>
+            <a:r>
+              <a:rPr lang="pt-BR" sz="3200" dirty="0">
+                <a:latin typeface="Exo 2" panose="00000500000000000000" pitchFamily="50" charset="0"/>
+              </a:rPr>
+              <a:t>Eu, enquanto </a:t>
+            </a:r>
+            <a:r>
+              <a:rPr lang="pt-BR" sz="3200" dirty="0">
+                <a:solidFill>
+                  <a:srgbClr val="FF0066"/>
+                </a:solidFill>
+                <a:latin typeface="Exo 2" panose="00000500000000000000" pitchFamily="50" charset="0"/>
+              </a:rPr>
+              <a:t>gerente de infraestrutura </a:t>
+            </a:r>
+            <a:r>
+              <a:rPr lang="pt-BR" sz="3200" dirty="0">
+                <a:latin typeface="Exo 2" panose="00000500000000000000" pitchFamily="50" charset="0"/>
+              </a:rPr>
+              <a:t>, preciso de um sistema que alerte quando os dispositivos estiverem com iminência de falhas para tomar decisões e manter o sistema em funcionamento</a:t>
+            </a:r>
+          </a:p>
+        </p:txBody>
+      </p:sp>
+    </p:spTree>
+    <p:extLst>
+      <p:ext uri="{BB962C8B-B14F-4D97-AF65-F5344CB8AC3E}">
+        <p14:creationId xmlns:p14="http://schemas.microsoft.com/office/powerpoint/2010/main" val="523630302"/>
+      </p:ext>
+    </p:extLst>
+  </p:cSld>
+  <p:clrMapOvr>
+    <a:masterClrMapping/>
+  </p:clrMapOvr>
+</p:sld>
+</file>
+
+<file path=ppt/slides/slide8.xml><?xml version="1.0" encoding="utf-8"?>
+<p:sld xmlns:a="http://schemas.openxmlformats.org/drawingml/2006/main" xmlns:r="http://schemas.openxmlformats.org/officeDocument/2006/relationships" xmlns:p="http://schemas.openxmlformats.org/presentationml/2006/main">
+  <p:cSld>
+    <p:spTree>
+      <p:nvGrpSpPr>
+        <p:cNvPr id="1" name=""/>
+        <p:cNvGrpSpPr/>
+        <p:nvPr/>
+      </p:nvGrpSpPr>
+      <p:grpSpPr>
+        <a:xfrm>
+          <a:off x="0" y="0"/>
+          <a:ext cx="0" cy="0"/>
+          <a:chOff x="0" y="0"/>
+          <a:chExt cx="0" cy="0"/>
+        </a:xfrm>
+      </p:grpSpPr>
+      <p:sp>
+        <p:nvSpPr>
+          <p:cNvPr id="2" name="Título 1">
+            <a:extLst>
+              <a:ext uri="{FF2B5EF4-FFF2-40B4-BE49-F238E27FC236}">
+                <a16:creationId xmlns:a16="http://schemas.microsoft.com/office/drawing/2014/main" id="{77359F12-3BAD-404F-91B0-F5331DC3BBD2}"/>
+              </a:ext>
+            </a:extLst>
+          </p:cNvPr>
+          <p:cNvSpPr>
+            <a:spLocks noGrp="1"/>
+          </p:cNvSpPr>
+          <p:nvPr>
+            <p:ph type="title"/>
+          </p:nvPr>
+        </p:nvSpPr>
+        <p:spPr/>
+        <p:txBody>
+          <a:bodyPr/>
+          <a:lstStyle/>
+          <a:p>
+            <a:r>
+              <a:rPr lang="pt-BR" sz="3300" b="1" dirty="0" err="1">
+                <a:solidFill>
+                  <a:srgbClr val="00B0F0"/>
+                </a:solidFill>
+                <a:latin typeface="Exo 2" panose="00000500000000000000" pitchFamily="50" charset="0"/>
+              </a:rPr>
+              <a:t>User</a:t>
+            </a:r>
+            <a:r>
+              <a:rPr lang="pt-BR" sz="3300" b="1" dirty="0">
+                <a:solidFill>
+                  <a:srgbClr val="00B0F0"/>
+                </a:solidFill>
+                <a:latin typeface="Exo 2" panose="00000500000000000000" pitchFamily="50" charset="0"/>
+              </a:rPr>
+              <a:t> Stories 5</a:t>
+            </a:r>
+            <a:br>
+              <a:rPr lang="pt-BR" dirty="0"/>
+            </a:br>
+            <a:endParaRPr lang="pt-BR" dirty="0"/>
+          </a:p>
+        </p:txBody>
+      </p:sp>
+      <p:sp>
+        <p:nvSpPr>
+          <p:cNvPr id="3" name="Espaço Reservado para Conteúdo 2">
+            <a:extLst>
+              <a:ext uri="{FF2B5EF4-FFF2-40B4-BE49-F238E27FC236}">
+                <a16:creationId xmlns:a16="http://schemas.microsoft.com/office/drawing/2014/main" id="{DDD43297-2D2C-41A1-81AC-C6A525CCE3CB}"/>
+              </a:ext>
+            </a:extLst>
+          </p:cNvPr>
+          <p:cNvSpPr>
+            <a:spLocks noGrp="1"/>
+          </p:cNvSpPr>
+          <p:nvPr>
+            <p:ph idx="1"/>
+          </p:nvPr>
+        </p:nvSpPr>
+        <p:spPr>
+          <a:xfrm>
+            <a:off x="838200" y="993912"/>
+            <a:ext cx="10515600" cy="2001079"/>
+          </a:xfrm>
+        </p:spPr>
+        <p:txBody>
+          <a:bodyPr>
+            <a:normAutofit fontScale="70000" lnSpcReduction="20000"/>
+          </a:bodyPr>
+          <a:lstStyle/>
+          <a:p>
+            <a:endParaRPr lang="pt-BR" dirty="0"/>
+          </a:p>
+          <a:p>
+            <a:endParaRPr lang="pt-BR" sz="3200" dirty="0"/>
+          </a:p>
+          <a:p>
+            <a:pPr marL="0" indent="0" algn="ctr">
+              <a:buNone/>
+            </a:pPr>
+            <a:r>
+              <a:rPr lang="pt-BR" sz="4300" dirty="0">
+                <a:latin typeface="Exo 2" panose="00000500000000000000" pitchFamily="50" charset="0"/>
+              </a:rPr>
+              <a:t>Eu, enquanto </a:t>
+            </a:r>
+            <a:r>
+              <a:rPr lang="pt-BR" sz="4300" dirty="0">
+                <a:solidFill>
+                  <a:srgbClr val="FF0066"/>
+                </a:solidFill>
+                <a:latin typeface="Exo 2" panose="00000500000000000000" pitchFamily="50" charset="0"/>
+              </a:rPr>
+              <a:t>analista de dados </a:t>
+            </a:r>
+            <a:r>
+              <a:rPr lang="pt-BR" sz="4300" dirty="0">
+                <a:latin typeface="Exo 2" panose="00000500000000000000" pitchFamily="50" charset="0"/>
+              </a:rPr>
+              <a:t>da empresa, preciso de um sistema que apresente relatórios de uso dos equipamentos controlar  o funcionamento dos dispositivos</a:t>
+            </a:r>
+          </a:p>
+        </p:txBody>
+      </p:sp>
+      <p:sp>
+        <p:nvSpPr>
+          <p:cNvPr id="6" name="Título 1">
+            <a:extLst>
+              <a:ext uri="{FF2B5EF4-FFF2-40B4-BE49-F238E27FC236}">
+                <a16:creationId xmlns:a16="http://schemas.microsoft.com/office/drawing/2014/main" id="{F306333A-719E-4819-ADA7-AD62AF8EF784}"/>
+              </a:ext>
+            </a:extLst>
+          </p:cNvPr>
+          <p:cNvSpPr txBox="1">
+            <a:spLocks/>
+          </p:cNvSpPr>
+          <p:nvPr/>
+        </p:nvSpPr>
+        <p:spPr>
+          <a:xfrm>
+            <a:off x="838200" y="3429000"/>
+            <a:ext cx="10515600" cy="1325563"/>
+          </a:xfrm>
+          <a:prstGeom prst="rect">
+            <a:avLst/>
+          </a:prstGeom>
+        </p:spPr>
+        <p:txBody>
+          <a:bodyPr vert="horz" lIns="91440" tIns="45720" rIns="91440" bIns="45720" rtlCol="0" anchor="ctr">
+            <a:normAutofit/>
+          </a:bodyPr>
+          <a:lstStyle>
+            <a:lvl1pPr algn="l" defTabSz="914400" rtl="0" eaLnBrk="1" latinLnBrk="0" hangingPunct="1">
+              <a:lnSpc>
+                <a:spcPct val="90000"/>
+              </a:lnSpc>
+              <a:spcBef>
+                <a:spcPct val="0"/>
+              </a:spcBef>
+              <a:buNone/>
+              <a:defRPr sz="4400" kern="1200">
+                <a:solidFill>
+                  <a:schemeClr val="tx1"/>
+                </a:solidFill>
+                <a:latin typeface="+mj-lt"/>
+                <a:ea typeface="+mj-ea"/>
+                <a:cs typeface="+mj-cs"/>
+              </a:defRPr>
+            </a:lvl1pPr>
+          </a:lstStyle>
+          <a:p>
+            <a:r>
+              <a:rPr lang="pt-BR" sz="3300" b="1" dirty="0" err="1">
+                <a:solidFill>
+                  <a:srgbClr val="00B0F0"/>
+                </a:solidFill>
+                <a:latin typeface="Exo 2" panose="00000500000000000000" pitchFamily="50" charset="0"/>
+              </a:rPr>
+              <a:t>User</a:t>
+            </a:r>
+            <a:r>
+              <a:rPr lang="pt-BR" sz="3300" b="1" dirty="0">
+                <a:solidFill>
+                  <a:srgbClr val="00B0F0"/>
+                </a:solidFill>
+                <a:latin typeface="Exo 2" panose="00000500000000000000" pitchFamily="50" charset="0"/>
+              </a:rPr>
+              <a:t> Stories 6</a:t>
+            </a:r>
+            <a:br>
+              <a:rPr lang="pt-BR" sz="3300" dirty="0"/>
+            </a:br>
+            <a:endParaRPr lang="pt-BR" sz="3300" dirty="0"/>
+          </a:p>
+        </p:txBody>
+      </p:sp>
+      <p:sp>
+        <p:nvSpPr>
+          <p:cNvPr id="7" name="Espaço Reservado para Conteúdo 2">
+            <a:extLst>
+              <a:ext uri="{FF2B5EF4-FFF2-40B4-BE49-F238E27FC236}">
+                <a16:creationId xmlns:a16="http://schemas.microsoft.com/office/drawing/2014/main" id="{4ACB9016-7FA1-4B57-8CAE-D5B020B402F6}"/>
+              </a:ext>
+            </a:extLst>
+          </p:cNvPr>
+          <p:cNvSpPr txBox="1">
+            <a:spLocks/>
+          </p:cNvSpPr>
+          <p:nvPr/>
+        </p:nvSpPr>
+        <p:spPr>
+          <a:xfrm>
+            <a:off x="838200" y="4068417"/>
+            <a:ext cx="10515600" cy="1795671"/>
+          </a:xfrm>
+          <a:prstGeom prst="rect">
+            <a:avLst/>
+          </a:prstGeom>
+        </p:spPr>
+        <p:txBody>
+          <a:bodyPr vert="horz" lIns="91440" tIns="45720" rIns="91440" bIns="45720" rtlCol="0">
+            <a:normAutofit fontScale="70000" lnSpcReduction="20000"/>
+          </a:bodyPr>
+          <a:lstStyle>
+            <a:lvl1pPr marL="228600" indent="-228600" algn="l" defTabSz="914400" rtl="0" eaLnBrk="1" latinLnBrk="0" hangingPunct="1">
+              <a:lnSpc>
+                <a:spcPct val="90000"/>
+              </a:lnSpc>
+              <a:spcBef>
+                <a:spcPts val="1000"/>
+              </a:spcBef>
+              <a:buFont typeface="Arial" panose="020B0604020202020204" pitchFamily="34" charset="0"/>
+              <a:buChar char="•"/>
+              <a:defRPr sz="2800" kern="1200">
+                <a:solidFill>
+                  <a:schemeClr val="tx1"/>
+                </a:solidFill>
+                <a:latin typeface="+mn-lt"/>
+                <a:ea typeface="+mn-ea"/>
+                <a:cs typeface="+mn-cs"/>
+              </a:defRPr>
+            </a:lvl1pPr>
+            <a:lvl2pPr marL="685800" indent="-228600" algn="l" defTabSz="914400" rtl="0" eaLnBrk="1" latinLnBrk="0" hangingPunct="1">
+              <a:lnSpc>
+                <a:spcPct val="90000"/>
+              </a:lnSpc>
+              <a:spcBef>
+                <a:spcPts val="500"/>
+              </a:spcBef>
+              <a:buFont typeface="Arial" panose="020B0604020202020204" pitchFamily="34" charset="0"/>
+              <a:buChar char="•"/>
+              <a:defRPr sz="2400" kern="1200">
+                <a:solidFill>
+                  <a:schemeClr val="tx1"/>
+                </a:solidFill>
+                <a:latin typeface="+mn-lt"/>
+                <a:ea typeface="+mn-ea"/>
+                <a:cs typeface="+mn-cs"/>
+              </a:defRPr>
+            </a:lvl2pPr>
+            <a:lvl3pPr marL="1143000" indent="-228600" algn="l" defTabSz="914400" rtl="0" eaLnBrk="1" latinLnBrk="0" hangingPunct="1">
+              <a:lnSpc>
+                <a:spcPct val="90000"/>
+              </a:lnSpc>
+              <a:spcBef>
+                <a:spcPts val="500"/>
+              </a:spcBef>
+              <a:buFont typeface="Arial" panose="020B0604020202020204" pitchFamily="34" charset="0"/>
+              <a:buChar char="•"/>
+              <a:defRPr sz="2000" kern="1200">
+                <a:solidFill>
+                  <a:schemeClr val="tx1"/>
+                </a:solidFill>
+                <a:latin typeface="+mn-lt"/>
+                <a:ea typeface="+mn-ea"/>
+                <a:cs typeface="+mn-cs"/>
+              </a:defRPr>
+            </a:lvl3pPr>
+            <a:lvl4pPr marL="1600200" indent="-228600" algn="l" defTabSz="914400" rtl="0" eaLnBrk="1" latinLnBrk="0" hangingPunct="1">
+              <a:lnSpc>
+                <a:spcPct val="90000"/>
+              </a:lnSpc>
+              <a:spcBef>
+                <a:spcPts val="500"/>
+              </a:spcBef>
+              <a:buFont typeface="Arial" panose="020B0604020202020204" pitchFamily="34" charset="0"/>
+              <a:buChar char="•"/>
+              <a:defRPr sz="1800" kern="1200">
+                <a:solidFill>
+                  <a:schemeClr val="tx1"/>
+                </a:solidFill>
+                <a:latin typeface="+mn-lt"/>
+                <a:ea typeface="+mn-ea"/>
+                <a:cs typeface="+mn-cs"/>
+              </a:defRPr>
+            </a:lvl4pPr>
+            <a:lvl5pPr marL="2057400" indent="-228600" algn="l" defTabSz="914400" rtl="0" eaLnBrk="1" latinLnBrk="0" hangingPunct="1">
+              <a:lnSpc>
+                <a:spcPct val="90000"/>
+              </a:lnSpc>
+              <a:spcBef>
+                <a:spcPts val="500"/>
+              </a:spcBef>
+              <a:buFont typeface="Arial" panose="020B0604020202020204" pitchFamily="34" charset="0"/>
+              <a:buChar char="•"/>
+              <a:defRPr sz="1800" kern="1200">
+                <a:solidFill>
+                  <a:schemeClr val="tx1"/>
+                </a:solidFill>
+                <a:latin typeface="+mn-lt"/>
+                <a:ea typeface="+mn-ea"/>
+                <a:cs typeface="+mn-cs"/>
+              </a:defRPr>
+            </a:lvl5pPr>
+            <a:lvl6pPr marL="2514600" indent="-228600" algn="l" defTabSz="914400" rtl="0" eaLnBrk="1" latinLnBrk="0" hangingPunct="1">
+              <a:lnSpc>
+                <a:spcPct val="90000"/>
+              </a:lnSpc>
+              <a:spcBef>
+                <a:spcPts val="500"/>
+              </a:spcBef>
+              <a:buFont typeface="Arial" panose="020B0604020202020204" pitchFamily="34" charset="0"/>
+              <a:buChar char="•"/>
+              <a:defRPr sz="1800" kern="1200">
+                <a:solidFill>
+                  <a:schemeClr val="tx1"/>
+                </a:solidFill>
+                <a:latin typeface="+mn-lt"/>
+                <a:ea typeface="+mn-ea"/>
+                <a:cs typeface="+mn-cs"/>
+              </a:defRPr>
+            </a:lvl6pPr>
+            <a:lvl7pPr marL="2971800" indent="-228600" algn="l" defTabSz="914400" rtl="0" eaLnBrk="1" latinLnBrk="0" hangingPunct="1">
+              <a:lnSpc>
+                <a:spcPct val="90000"/>
+              </a:lnSpc>
+              <a:spcBef>
+                <a:spcPts val="500"/>
+              </a:spcBef>
+              <a:buFont typeface="Arial" panose="020B0604020202020204" pitchFamily="34" charset="0"/>
+              <a:buChar char="•"/>
+              <a:defRPr sz="1800" kern="1200">
+                <a:solidFill>
+                  <a:schemeClr val="tx1"/>
+                </a:solidFill>
+                <a:latin typeface="+mn-lt"/>
+                <a:ea typeface="+mn-ea"/>
+                <a:cs typeface="+mn-cs"/>
+              </a:defRPr>
+            </a:lvl7pPr>
+            <a:lvl8pPr marL="3429000" indent="-228600" algn="l" defTabSz="914400" rtl="0" eaLnBrk="1" latinLnBrk="0" hangingPunct="1">
+              <a:lnSpc>
+                <a:spcPct val="90000"/>
+              </a:lnSpc>
+              <a:spcBef>
+                <a:spcPts val="500"/>
+              </a:spcBef>
+              <a:buFont typeface="Arial" panose="020B0604020202020204" pitchFamily="34" charset="0"/>
+              <a:buChar char="•"/>
+              <a:defRPr sz="1800" kern="1200">
+                <a:solidFill>
+                  <a:schemeClr val="tx1"/>
+                </a:solidFill>
+                <a:latin typeface="+mn-lt"/>
+                <a:ea typeface="+mn-ea"/>
+                <a:cs typeface="+mn-cs"/>
+              </a:defRPr>
+            </a:lvl8pPr>
+            <a:lvl9pPr marL="3886200" indent="-228600" algn="l" defTabSz="914400" rtl="0" eaLnBrk="1" latinLnBrk="0" hangingPunct="1">
+              <a:lnSpc>
+                <a:spcPct val="90000"/>
+              </a:lnSpc>
+              <a:spcBef>
+                <a:spcPts val="500"/>
+              </a:spcBef>
+              <a:buFont typeface="Arial" panose="020B0604020202020204" pitchFamily="34" charset="0"/>
+              <a:buChar char="•"/>
+              <a:defRPr sz="1800" kern="1200">
+                <a:solidFill>
+                  <a:schemeClr val="tx1"/>
+                </a:solidFill>
+                <a:latin typeface="+mn-lt"/>
+                <a:ea typeface="+mn-ea"/>
+                <a:cs typeface="+mn-cs"/>
+              </a:defRPr>
+            </a:lvl9pPr>
+          </a:lstStyle>
+          <a:p>
+            <a:endParaRPr lang="pt-BR" dirty="0"/>
+          </a:p>
+          <a:p>
+            <a:endParaRPr lang="pt-BR" sz="3200" dirty="0"/>
+          </a:p>
+          <a:p>
+            <a:pPr marL="0" indent="0" algn="ctr">
+              <a:buNone/>
+            </a:pPr>
+            <a:r>
+              <a:rPr lang="pt-BR" sz="4300" dirty="0">
+                <a:latin typeface="Exo 2" panose="00000500000000000000" pitchFamily="50" charset="0"/>
+              </a:rPr>
+              <a:t>Eu, enquanto </a:t>
+            </a:r>
+            <a:r>
+              <a:rPr lang="pt-BR" sz="4300" dirty="0">
+                <a:solidFill>
+                  <a:srgbClr val="FF0066"/>
+                </a:solidFill>
+                <a:latin typeface="Exo 2" panose="00000500000000000000" pitchFamily="50" charset="0"/>
+              </a:rPr>
+              <a:t>gerente de infraestrutura</a:t>
+            </a:r>
+            <a:r>
+              <a:rPr lang="pt-BR" sz="4300" dirty="0">
+                <a:latin typeface="Exo 2" panose="00000500000000000000" pitchFamily="50" charset="0"/>
+              </a:rPr>
+              <a:t>, preciso de um sistema com um backup da base de dados sempre atualizado para utilizar em casos de emergência</a:t>
+            </a:r>
+          </a:p>
+        </p:txBody>
+      </p:sp>
+    </p:spTree>
+    <p:extLst>
+      <p:ext uri="{BB962C8B-B14F-4D97-AF65-F5344CB8AC3E}">
+        <p14:creationId xmlns:p14="http://schemas.microsoft.com/office/powerpoint/2010/main" val="3170255746"/>
+      </p:ext>
+    </p:extLst>
+  </p:cSld>
+  <p:clrMapOvr>
+    <a:masterClrMapping/>
+  </p:clrMapOvr>
+</p:sld>
+</file>
+
+<file path=ppt/slides/slide9.xml><?xml version="1.0" encoding="utf-8"?>
+<p:sld xmlns:a="http://schemas.openxmlformats.org/drawingml/2006/main" xmlns:r="http://schemas.openxmlformats.org/officeDocument/2006/relationships" xmlns:p="http://schemas.openxmlformats.org/presentationml/2006/main">
+  <p:cSld>
+    <p:spTree>
+      <p:nvGrpSpPr>
+        <p:cNvPr id="1" name=""/>
+        <p:cNvGrpSpPr/>
+        <p:nvPr/>
+      </p:nvGrpSpPr>
+      <p:grpSpPr>
+        <a:xfrm>
+          <a:off x="0" y="0"/>
+          <a:ext cx="0" cy="0"/>
+          <a:chOff x="0" y="0"/>
+          <a:chExt cx="0" cy="0"/>
+        </a:xfrm>
+      </p:grpSpPr>
+      <p:sp>
+        <p:nvSpPr>
+          <p:cNvPr id="2" name="Título 1">
+            <a:extLst>
+              <a:ext uri="{FF2B5EF4-FFF2-40B4-BE49-F238E27FC236}">
+                <a16:creationId xmlns:a16="http://schemas.microsoft.com/office/drawing/2014/main" id="{79154C64-B7C5-438B-A45A-1F55555A552B}"/>
+              </a:ext>
+            </a:extLst>
+          </p:cNvPr>
+          <p:cNvSpPr txBox="1">
+            <a:spLocks/>
+          </p:cNvSpPr>
+          <p:nvPr/>
+        </p:nvSpPr>
+        <p:spPr>
+          <a:xfrm>
+            <a:off x="838200" y="365125"/>
+            <a:ext cx="10515600" cy="1325563"/>
+          </a:xfrm>
+          <a:prstGeom prst="rect">
+            <a:avLst/>
+          </a:prstGeom>
+        </p:spPr>
+        <p:txBody>
+          <a:bodyPr/>
+          <a:lstStyle>
+            <a:lvl1pPr algn="l" defTabSz="914400" rtl="0" eaLnBrk="1" latinLnBrk="0" hangingPunct="1">
+              <a:lnSpc>
+                <a:spcPct val="90000"/>
+              </a:lnSpc>
+              <a:spcBef>
+                <a:spcPct val="0"/>
+              </a:spcBef>
+              <a:buNone/>
+              <a:defRPr sz="4400" kern="1200">
+                <a:solidFill>
+                  <a:schemeClr val="tx1"/>
+                </a:solidFill>
+                <a:latin typeface="+mj-lt"/>
+                <a:ea typeface="+mj-ea"/>
+                <a:cs typeface="+mj-cs"/>
+              </a:defRPr>
+            </a:lvl1pPr>
+          </a:lstStyle>
+          <a:p>
+            <a:r>
+              <a:rPr lang="pt-BR" sz="3300" b="1" dirty="0">
+                <a:solidFill>
+                  <a:srgbClr val="00B0F0"/>
+                </a:solidFill>
+                <a:latin typeface="Exo 2" panose="00000500000000000000" pitchFamily="50" charset="0"/>
+              </a:rPr>
+              <a:t>Requisitos</a:t>
+            </a:r>
+            <a:endParaRPr lang="pt-BR" dirty="0"/>
+          </a:p>
+        </p:txBody>
+      </p:sp>
+      <p:pic>
+        <p:nvPicPr>
+          <p:cNvPr id="1026" name="Picture 2" descr="Resultado de imagem para requisitos">
+            <a:hlinkClick r:id="rId2" action="ppaction://hlinkfile"/>
+            <a:extLst>
+              <a:ext uri="{FF2B5EF4-FFF2-40B4-BE49-F238E27FC236}">
+                <a16:creationId xmlns:a16="http://schemas.microsoft.com/office/drawing/2014/main" id="{0D05C6FA-FDEA-4F58-A1AF-87CB413F7E99}"/>
+              </a:ext>
+            </a:extLst>
+          </p:cNvPr>
+          <p:cNvPicPr>
+            <a:picLocks noChangeAspect="1" noChangeArrowheads="1"/>
+          </p:cNvPicPr>
+          <p:nvPr/>
+        </p:nvPicPr>
+        <p:blipFill>
+          <a:blip r:embed="rId3">
+            <a:extLst>
+              <a:ext uri="{28A0092B-C50C-407E-A947-70E740481C1C}">
+                <a14:useLocalDpi xmlns:a14="http://schemas.microsoft.com/office/drawing/2010/main" val="0"/>
+              </a:ext>
+            </a:extLst>
+          </a:blip>
+          <a:srcRect/>
+          <a:stretch>
+            <a:fillRect/>
+          </a:stretch>
+        </p:blipFill>
+        <p:spPr bwMode="auto">
+          <a:xfrm>
+            <a:off x="4191000" y="1690688"/>
+            <a:ext cx="3810000" cy="3810000"/>
+          </a:xfrm>
+          <a:prstGeom prst="rect">
+            <a:avLst/>
+          </a:prstGeom>
+          <a:noFill/>
+          <a:extLst>
+            <a:ext uri="{909E8E84-426E-40DD-AFC4-6F175D3DCCD1}">
+              <a14:hiddenFill xmlns:a14="http://schemas.microsoft.com/office/drawing/2010/main">
+                <a:solidFill>
+                  <a:srgbClr val="FFFFFF"/>
+                </a:solidFill>
+              </a14:hiddenFill>
+            </a:ext>
+          </a:extLst>
+        </p:spPr>
+      </p:pic>
+    </p:spTree>
+    <p:extLst>
+      <p:ext uri="{BB962C8B-B14F-4D97-AF65-F5344CB8AC3E}">
+        <p14:creationId xmlns:p14="http://schemas.microsoft.com/office/powerpoint/2010/main" val="369677390"/>
       </p:ext>
     </p:extLst>
   </p:cSld>

</xml_diff>